<commit_message>
(LJH) PPT make a change
피피티 들어갈거 간략하게 생각해봄
</commit_message>
<xml_diff>
--- a/Dongseo/Dongseo_Art&IndieGame_PPT.pptx
+++ b/Dongseo/Dongseo_Art&IndieGame_PPT.pptx
@@ -5,7 +5,13 @@
     <p:sldMasterId id="2147483648" r:id="rId1"/>
   </p:sldMasterIdLst>
   <p:sldIdLst>
-    <p:sldId id="256" r:id="rId2"/>
+    <p:sldId id="258" r:id="rId2"/>
+    <p:sldId id="259" r:id="rId3"/>
+    <p:sldId id="260" r:id="rId4"/>
+    <p:sldId id="261" r:id="rId5"/>
+    <p:sldId id="262" r:id="rId6"/>
+    <p:sldId id="257" r:id="rId7"/>
+    <p:sldId id="263" r:id="rId8"/>
   </p:sldIdLst>
   <p:sldSz cx="12192000" cy="6858000"/>
   <p:notesSz cx="6858000" cy="9144000"/>
@@ -104,6 +110,11 @@
       </a:defRPr>
     </a:lvl9pPr>
   </p:defaultTextStyle>
+  <p:extLst>
+    <p:ext uri="{EFAFB233-063F-42B5-8137-9DF3F51BA10A}">
+      <p15:sldGuideLst xmlns:p15="http://schemas.microsoft.com/office/powerpoint/2012/main"/>
+    </p:ext>
+  </p:extLst>
 </p:presentation>
 </file>
 
@@ -3307,6 +3318,14 @@
 <file path=ppt/slides/slide1.xml><?xml version="1.0" encoding="utf-8"?>
 <p:sld xmlns:a="http://schemas.openxmlformats.org/drawingml/2006/main" xmlns:r="http://schemas.openxmlformats.org/officeDocument/2006/relationships" xmlns:p="http://schemas.openxmlformats.org/presentationml/2006/main">
   <p:cSld>
+    <p:bg>
+      <p:bgPr>
+        <a:solidFill>
+          <a:schemeClr val="accent5"/>
+        </a:solidFill>
+        <a:effectLst/>
+      </p:bgPr>
+    </p:bg>
     <p:spTree>
       <p:nvGrpSpPr>
         <p:cNvPr id="1" name=""/>
@@ -3323,32 +3342,52 @@
       </p:grpSpPr>
       <p:sp>
         <p:nvSpPr>
-          <p:cNvPr id="2" name="제목 1">
-            <a:extLst>
-              <a:ext uri="{FF2B5EF4-FFF2-40B4-BE49-F238E27FC236}">
-                <a16:creationId xmlns:a16="http://schemas.microsoft.com/office/drawing/2014/main" id="{7E384D72-9B3D-B997-BB75-02E6C99BEB7B}"/>
-              </a:ext>
-            </a:extLst>
-          </p:cNvPr>
-          <p:cNvSpPr>
-            <a:spLocks noGrp="1"/>
+          <p:cNvPr id="8" name="제목 1">
+            <a:extLst>
+              <a:ext uri="{FF2B5EF4-FFF2-40B4-BE49-F238E27FC236}">
+                <a16:creationId xmlns:a16="http://schemas.microsoft.com/office/drawing/2014/main" id="{23A4D72F-07BE-E82C-50B7-4F1845094F1B}"/>
+              </a:ext>
+            </a:extLst>
+          </p:cNvPr>
+          <p:cNvSpPr txBox="1">
+            <a:spLocks/>
           </p:cNvSpPr>
-          <p:nvPr>
-            <p:ph type="ctrTitle"/>
-          </p:nvPr>
+          <p:nvPr/>
         </p:nvSpPr>
         <p:spPr>
           <a:xfrm>
             <a:off x="1524000" y="1122362"/>
             <a:ext cx="9144000" cy="4063591"/>
           </a:xfrm>
+          <a:prstGeom prst="rect">
+            <a:avLst/>
+          </a:prstGeom>
         </p:spPr>
         <p:txBody>
-          <a:bodyPr anchor="ctr">
+          <a:bodyPr vert="horz" lIns="91440" tIns="45720" rIns="91440" bIns="45720" rtlCol="0" anchor="ctr">
             <a:normAutofit/>
           </a:bodyPr>
-          <a:lstStyle/>
-          <a:p>
+          <a:lstStyle>
+            <a:lvl1pPr algn="l" defTabSz="914400" rtl="0" eaLnBrk="1" latinLnBrk="1" hangingPunct="1">
+              <a:lnSpc>
+                <a:spcPct val="90000"/>
+              </a:lnSpc>
+              <a:spcBef>
+                <a:spcPct val="0"/>
+              </a:spcBef>
+              <a:buNone/>
+              <a:defRPr sz="4400" kern="1200">
+                <a:solidFill>
+                  <a:schemeClr val="tx1"/>
+                </a:solidFill>
+                <a:latin typeface="+mj-lt"/>
+                <a:ea typeface="+mj-ea"/>
+                <a:cs typeface="+mj-cs"/>
+              </a:defRPr>
+            </a:lvl1pPr>
+          </a:lstStyle>
+          <a:p>
+            <a:pPr algn="ctr"/>
             <a:r>
               <a:rPr lang="ko-KR" altLang="en-US" sz="3000" dirty="0"/>
               <a:t>게임제목 </a:t>
@@ -3401,13 +3440,2672 @@
               <a:rPr lang="ko-KR" altLang="en-US" sz="3000" dirty="0"/>
               <a:t>모바일</a:t>
             </a:r>
+            <a:endParaRPr lang="en-US" altLang="ko-KR" sz="3000" dirty="0"/>
+          </a:p>
+          <a:p>
+            <a:pPr algn="ctr"/>
+            <a:endParaRPr lang="en-US" altLang="ko-KR" sz="3000" dirty="0"/>
+          </a:p>
+          <a:p>
+            <a:pPr algn="ctr"/>
+            <a:r>
+              <a:rPr lang="ko-KR" altLang="en-US" sz="3000" dirty="0"/>
+              <a:t>화면사이즈 </a:t>
+            </a:r>
+            <a:r>
+              <a:rPr lang="en-US" altLang="ko-KR" sz="3000" dirty="0"/>
+              <a:t>: </a:t>
+            </a:r>
+            <a:r>
+              <a:rPr lang="ko-KR" altLang="en-US" sz="3000" dirty="0"/>
+              <a:t>미정</a:t>
+            </a:r>
           </a:p>
         </p:txBody>
       </p:sp>
     </p:spTree>
     <p:extLst>
       <p:ext uri="{BB962C8B-B14F-4D97-AF65-F5344CB8AC3E}">
-        <p14:creationId xmlns:p14="http://schemas.microsoft.com/office/powerpoint/2010/main" val="1061326259"/>
+        <p14:creationId xmlns:p14="http://schemas.microsoft.com/office/powerpoint/2010/main" val="874500323"/>
+      </p:ext>
+    </p:extLst>
+  </p:cSld>
+  <p:clrMapOvr>
+    <a:masterClrMapping/>
+  </p:clrMapOvr>
+</p:sld>
+</file>
+
+<file path=ppt/slides/slide2.xml><?xml version="1.0" encoding="utf-8"?>
+<p:sld xmlns:a="http://schemas.openxmlformats.org/drawingml/2006/main" xmlns:r="http://schemas.openxmlformats.org/officeDocument/2006/relationships" xmlns:p="http://schemas.openxmlformats.org/presentationml/2006/main">
+  <p:cSld>
+    <p:bg>
+      <p:bgPr>
+        <a:solidFill>
+          <a:schemeClr val="accent5"/>
+        </a:solidFill>
+        <a:effectLst/>
+      </p:bgPr>
+    </p:bg>
+    <p:spTree>
+      <p:nvGrpSpPr>
+        <p:cNvPr id="1" name=""/>
+        <p:cNvGrpSpPr/>
+        <p:nvPr/>
+      </p:nvGrpSpPr>
+      <p:grpSpPr>
+        <a:xfrm>
+          <a:off x="0" y="0"/>
+          <a:ext cx="0" cy="0"/>
+          <a:chOff x="0" y="0"/>
+          <a:chExt cx="0" cy="0"/>
+        </a:xfrm>
+      </p:grpSpPr>
+      <p:pic>
+        <p:nvPicPr>
+          <p:cNvPr id="5" name="그림 4">
+            <a:extLst>
+              <a:ext uri="{FF2B5EF4-FFF2-40B4-BE49-F238E27FC236}">
+                <a16:creationId xmlns:a16="http://schemas.microsoft.com/office/drawing/2014/main" id="{67F3C27E-EBA0-9539-7567-8B9C5F93B3AB}"/>
+              </a:ext>
+            </a:extLst>
+          </p:cNvPr>
+          <p:cNvPicPr>
+            <a:picLocks noChangeAspect="1"/>
+          </p:cNvPicPr>
+          <p:nvPr/>
+        </p:nvPicPr>
+        <p:blipFill>
+          <a:blip r:embed="rId2"/>
+          <a:stretch>
+            <a:fillRect/>
+          </a:stretch>
+        </p:blipFill>
+        <p:spPr>
+          <a:xfrm>
+            <a:off x="3673311" y="697104"/>
+            <a:ext cx="4845377" cy="2358756"/>
+          </a:xfrm>
+          <a:prstGeom prst="rect">
+            <a:avLst/>
+          </a:prstGeom>
+        </p:spPr>
+      </p:pic>
+      <p:sp>
+        <p:nvSpPr>
+          <p:cNvPr id="7" name="TextBox 6">
+            <a:extLst>
+              <a:ext uri="{FF2B5EF4-FFF2-40B4-BE49-F238E27FC236}">
+                <a16:creationId xmlns:a16="http://schemas.microsoft.com/office/drawing/2014/main" id="{60CF86E5-921D-E859-9DA1-17AF85B3CE81}"/>
+              </a:ext>
+            </a:extLst>
+          </p:cNvPr>
+          <p:cNvSpPr txBox="1"/>
+          <p:nvPr/>
+        </p:nvSpPr>
+        <p:spPr>
+          <a:xfrm>
+            <a:off x="3746517" y="3717300"/>
+            <a:ext cx="5474576" cy="2031325"/>
+          </a:xfrm>
+          <a:prstGeom prst="rect">
+            <a:avLst/>
+          </a:prstGeom>
+          <a:noFill/>
+        </p:spPr>
+        <p:txBody>
+          <a:bodyPr wrap="none" rtlCol="0">
+            <a:spAutoFit/>
+          </a:bodyPr>
+          <a:lstStyle/>
+          <a:p>
+            <a:r>
+              <a:rPr lang="ko-KR" altLang="en-US" b="1" dirty="0" err="1">
+                <a:solidFill>
+                  <a:schemeClr val="bg1"/>
+                </a:solidFill>
+              </a:rPr>
+              <a:t>들어가는기능</a:t>
+            </a:r>
+            <a:endParaRPr lang="en-US" altLang="ko-KR" b="1" dirty="0">
+              <a:solidFill>
+                <a:schemeClr val="bg1"/>
+              </a:solidFill>
+            </a:endParaRPr>
+          </a:p>
+          <a:p>
+            <a:endParaRPr lang="en-US" altLang="ko-KR" b="1" dirty="0">
+              <a:solidFill>
+                <a:schemeClr val="bg1"/>
+              </a:solidFill>
+            </a:endParaRPr>
+          </a:p>
+          <a:p>
+            <a:pPr marL="342900" indent="-342900">
+              <a:buAutoNum type="arabicPeriod"/>
+            </a:pPr>
+            <a:r>
+              <a:rPr lang="ko-KR" altLang="en-US" b="1" dirty="0" err="1">
+                <a:solidFill>
+                  <a:schemeClr val="bg1"/>
+                </a:solidFill>
+              </a:rPr>
+              <a:t>버튼누르는</a:t>
+            </a:r>
+            <a:r>
+              <a:rPr lang="ko-KR" altLang="en-US" b="1" dirty="0">
+                <a:solidFill>
+                  <a:schemeClr val="bg1"/>
+                </a:solidFill>
+              </a:rPr>
+              <a:t> </a:t>
+            </a:r>
+            <a:r>
+              <a:rPr lang="en-US" altLang="ko-KR" b="1" dirty="0">
+                <a:solidFill>
+                  <a:schemeClr val="bg1"/>
+                </a:solidFill>
+              </a:rPr>
+              <a:t>UI </a:t>
+            </a:r>
+            <a:r>
+              <a:rPr lang="ko-KR" altLang="en-US" b="1" dirty="0">
+                <a:solidFill>
+                  <a:schemeClr val="bg1"/>
+                </a:solidFill>
+              </a:rPr>
+              <a:t>및 애니메이션</a:t>
+            </a:r>
+            <a:endParaRPr lang="en-US" altLang="ko-KR" b="1" dirty="0">
+              <a:solidFill>
+                <a:schemeClr val="bg1"/>
+              </a:solidFill>
+            </a:endParaRPr>
+          </a:p>
+          <a:p>
+            <a:pPr marL="342900" indent="-342900">
+              <a:buAutoNum type="arabicPeriod"/>
+            </a:pPr>
+            <a:r>
+              <a:rPr lang="ko-KR" altLang="en-US" b="1" dirty="0" err="1">
+                <a:solidFill>
+                  <a:schemeClr val="bg1"/>
+                </a:solidFill>
+              </a:rPr>
+              <a:t>커스텀할지말지는</a:t>
+            </a:r>
+            <a:r>
+              <a:rPr lang="ko-KR" altLang="en-US" b="1" dirty="0">
+                <a:solidFill>
+                  <a:schemeClr val="bg1"/>
+                </a:solidFill>
+              </a:rPr>
+              <a:t> 모르겠지만 커스텀</a:t>
+            </a:r>
+            <a:endParaRPr lang="en-US" altLang="ko-KR" b="1" dirty="0">
+              <a:solidFill>
+                <a:schemeClr val="bg1"/>
+              </a:solidFill>
+            </a:endParaRPr>
+          </a:p>
+          <a:p>
+            <a:pPr marL="342900" indent="-342900">
+              <a:buAutoNum type="arabicPeriod"/>
+            </a:pPr>
+            <a:r>
+              <a:rPr lang="ko-KR" altLang="en-US" b="1" dirty="0">
+                <a:solidFill>
+                  <a:schemeClr val="bg1"/>
+                </a:solidFill>
+              </a:rPr>
+              <a:t>옵션기능</a:t>
+            </a:r>
+            <a:r>
+              <a:rPr lang="en-US" altLang="ko-KR" b="1" dirty="0">
+                <a:solidFill>
+                  <a:schemeClr val="bg1"/>
+                </a:solidFill>
+              </a:rPr>
+              <a:t>(</a:t>
+            </a:r>
+            <a:r>
+              <a:rPr lang="ko-KR" altLang="en-US" b="1" dirty="0">
+                <a:solidFill>
+                  <a:schemeClr val="bg1"/>
+                </a:solidFill>
+              </a:rPr>
+              <a:t>사운드 </a:t>
+            </a:r>
+            <a:r>
+              <a:rPr lang="en-US" altLang="ko-KR" b="1" dirty="0">
+                <a:solidFill>
+                  <a:schemeClr val="bg1"/>
+                </a:solidFill>
+              </a:rPr>
+              <a:t>On/Off)</a:t>
+            </a:r>
+          </a:p>
+          <a:p>
+            <a:pPr marL="342900" indent="-342900">
+              <a:buAutoNum type="arabicPeriod"/>
+            </a:pPr>
+            <a:r>
+              <a:rPr lang="ko-KR" altLang="en-US" b="1" dirty="0">
+                <a:solidFill>
+                  <a:schemeClr val="bg1"/>
+                </a:solidFill>
+              </a:rPr>
+              <a:t>플레이버튼을 </a:t>
+            </a:r>
+            <a:r>
+              <a:rPr lang="ko-KR" altLang="en-US" b="1" dirty="0" err="1">
+                <a:solidFill>
+                  <a:schemeClr val="bg1"/>
+                </a:solidFill>
+              </a:rPr>
+              <a:t>클릭시</a:t>
+            </a:r>
+            <a:r>
+              <a:rPr lang="ko-KR" altLang="en-US" b="1" dirty="0">
+                <a:solidFill>
+                  <a:schemeClr val="bg1"/>
+                </a:solidFill>
+              </a:rPr>
+              <a:t> 각종 스테이지창으로 로드</a:t>
+            </a:r>
+            <a:endParaRPr lang="en-US" altLang="ko-KR" b="1" dirty="0">
+              <a:solidFill>
+                <a:schemeClr val="bg1"/>
+              </a:solidFill>
+            </a:endParaRPr>
+          </a:p>
+          <a:p>
+            <a:pPr marL="342900" indent="-342900">
+              <a:buAutoNum type="arabicPeriod"/>
+            </a:pPr>
+            <a:r>
+              <a:rPr lang="ko-KR" altLang="en-US" b="1" dirty="0" err="1">
+                <a:solidFill>
+                  <a:schemeClr val="bg1"/>
+                </a:solidFill>
+              </a:rPr>
+              <a:t>뒤로가기</a:t>
+            </a:r>
+            <a:r>
+              <a:rPr lang="ko-KR" altLang="en-US" b="1" dirty="0">
+                <a:solidFill>
+                  <a:schemeClr val="bg1"/>
+                </a:solidFill>
+              </a:rPr>
+              <a:t> </a:t>
+            </a:r>
+            <a:r>
+              <a:rPr lang="ko-KR" altLang="en-US" b="1" dirty="0" err="1">
+                <a:solidFill>
+                  <a:schemeClr val="bg1"/>
+                </a:solidFill>
+              </a:rPr>
+              <a:t>버튼눌렀을시에</a:t>
+            </a:r>
+            <a:r>
+              <a:rPr lang="ko-KR" altLang="en-US" b="1" dirty="0">
+                <a:solidFill>
+                  <a:schemeClr val="bg1"/>
+                </a:solidFill>
+              </a:rPr>
+              <a:t> 전화면 이동</a:t>
+            </a:r>
+            <a:endParaRPr lang="en-US" altLang="ko-KR" b="1" dirty="0">
+              <a:solidFill>
+                <a:schemeClr val="bg1"/>
+              </a:solidFill>
+            </a:endParaRPr>
+          </a:p>
+        </p:txBody>
+      </p:sp>
+    </p:spTree>
+    <p:extLst>
+      <p:ext uri="{BB962C8B-B14F-4D97-AF65-F5344CB8AC3E}">
+        <p14:creationId xmlns:p14="http://schemas.microsoft.com/office/powerpoint/2010/main" val="1048699807"/>
+      </p:ext>
+    </p:extLst>
+  </p:cSld>
+  <p:clrMapOvr>
+    <a:masterClrMapping/>
+  </p:clrMapOvr>
+</p:sld>
+</file>
+
+<file path=ppt/slides/slide3.xml><?xml version="1.0" encoding="utf-8"?>
+<p:sld xmlns:a="http://schemas.openxmlformats.org/drawingml/2006/main" xmlns:r="http://schemas.openxmlformats.org/officeDocument/2006/relationships" xmlns:p="http://schemas.openxmlformats.org/presentationml/2006/main">
+  <p:cSld>
+    <p:bg>
+      <p:bgPr>
+        <a:solidFill>
+          <a:schemeClr val="accent5"/>
+        </a:solidFill>
+        <a:effectLst/>
+      </p:bgPr>
+    </p:bg>
+    <p:spTree>
+      <p:nvGrpSpPr>
+        <p:cNvPr id="1" name=""/>
+        <p:cNvGrpSpPr/>
+        <p:nvPr/>
+      </p:nvGrpSpPr>
+      <p:grpSpPr>
+        <a:xfrm>
+          <a:off x="0" y="0"/>
+          <a:ext cx="0" cy="0"/>
+          <a:chOff x="0" y="0"/>
+          <a:chExt cx="0" cy="0"/>
+        </a:xfrm>
+      </p:grpSpPr>
+      <p:pic>
+        <p:nvPicPr>
+          <p:cNvPr id="6" name="그림 5">
+            <a:extLst>
+              <a:ext uri="{FF2B5EF4-FFF2-40B4-BE49-F238E27FC236}">
+                <a16:creationId xmlns:a16="http://schemas.microsoft.com/office/drawing/2014/main" id="{80058B81-16F1-96FC-6B0E-1D6F8E2A10D6}"/>
+              </a:ext>
+            </a:extLst>
+          </p:cNvPr>
+          <p:cNvPicPr>
+            <a:picLocks noChangeAspect="1"/>
+          </p:cNvPicPr>
+          <p:nvPr/>
+        </p:nvPicPr>
+        <p:blipFill>
+          <a:blip r:embed="rId2"/>
+          <a:stretch>
+            <a:fillRect/>
+          </a:stretch>
+        </p:blipFill>
+        <p:spPr>
+          <a:xfrm>
+            <a:off x="3124005" y="607122"/>
+            <a:ext cx="5656082" cy="2753412"/>
+          </a:xfrm>
+          <a:prstGeom prst="rect">
+            <a:avLst/>
+          </a:prstGeom>
+        </p:spPr>
+      </p:pic>
+      <p:sp>
+        <p:nvSpPr>
+          <p:cNvPr id="7" name="TextBox 6">
+            <a:extLst>
+              <a:ext uri="{FF2B5EF4-FFF2-40B4-BE49-F238E27FC236}">
+                <a16:creationId xmlns:a16="http://schemas.microsoft.com/office/drawing/2014/main" id="{B880BBA0-C96B-C54F-E208-DD7A281F735F}"/>
+              </a:ext>
+            </a:extLst>
+          </p:cNvPr>
+          <p:cNvSpPr txBox="1"/>
+          <p:nvPr/>
+        </p:nvSpPr>
+        <p:spPr>
+          <a:xfrm>
+            <a:off x="2943049" y="3820234"/>
+            <a:ext cx="6017994" cy="1754326"/>
+          </a:xfrm>
+          <a:prstGeom prst="rect">
+            <a:avLst/>
+          </a:prstGeom>
+          <a:noFill/>
+        </p:spPr>
+        <p:txBody>
+          <a:bodyPr wrap="none" rtlCol="0">
+            <a:spAutoFit/>
+          </a:bodyPr>
+          <a:lstStyle/>
+          <a:p>
+            <a:r>
+              <a:rPr lang="ko-KR" altLang="en-US" b="1" dirty="0" err="1">
+                <a:solidFill>
+                  <a:schemeClr val="bg1"/>
+                </a:solidFill>
+              </a:rPr>
+              <a:t>들어가는기능</a:t>
+            </a:r>
+            <a:endParaRPr lang="en-US" altLang="ko-KR" b="1" dirty="0">
+              <a:solidFill>
+                <a:schemeClr val="bg1"/>
+              </a:solidFill>
+            </a:endParaRPr>
+          </a:p>
+          <a:p>
+            <a:endParaRPr lang="en-US" altLang="ko-KR" b="1" dirty="0">
+              <a:solidFill>
+                <a:schemeClr val="bg1"/>
+              </a:solidFill>
+            </a:endParaRPr>
+          </a:p>
+          <a:p>
+            <a:pPr marL="342900" indent="-342900">
+              <a:buAutoNum type="arabicPeriod"/>
+            </a:pPr>
+            <a:r>
+              <a:rPr lang="ko-KR" altLang="en-US" b="1" dirty="0">
+                <a:solidFill>
+                  <a:schemeClr val="bg1"/>
+                </a:solidFill>
+              </a:rPr>
+              <a:t>하단에 화살표를 </a:t>
+            </a:r>
+            <a:r>
+              <a:rPr lang="ko-KR" altLang="en-US" b="1" dirty="0" err="1">
+                <a:solidFill>
+                  <a:schemeClr val="bg1"/>
+                </a:solidFill>
+              </a:rPr>
+              <a:t>눌렀을시</a:t>
+            </a:r>
+            <a:r>
+              <a:rPr lang="ko-KR" altLang="en-US" b="1" dirty="0">
+                <a:solidFill>
+                  <a:schemeClr val="bg1"/>
+                </a:solidFill>
+              </a:rPr>
+              <a:t> </a:t>
+            </a:r>
+            <a:r>
+              <a:rPr lang="ko-KR" altLang="en-US" b="1" dirty="0" err="1">
+                <a:solidFill>
+                  <a:schemeClr val="bg1"/>
+                </a:solidFill>
+              </a:rPr>
+              <a:t>왼쪽끝</a:t>
+            </a:r>
+            <a:r>
+              <a:rPr lang="ko-KR" altLang="en-US" b="1" dirty="0">
+                <a:solidFill>
+                  <a:schemeClr val="bg1"/>
+                </a:solidFill>
+              </a:rPr>
+              <a:t> </a:t>
+            </a:r>
+            <a:r>
+              <a:rPr lang="ko-KR" altLang="en-US" b="1" dirty="0" err="1">
+                <a:solidFill>
+                  <a:schemeClr val="bg1"/>
+                </a:solidFill>
+              </a:rPr>
+              <a:t>오른쪽끝으로</a:t>
+            </a:r>
+            <a:r>
+              <a:rPr lang="ko-KR" altLang="en-US" b="1" dirty="0">
+                <a:solidFill>
+                  <a:schemeClr val="bg1"/>
+                </a:solidFill>
+              </a:rPr>
+              <a:t> 가짐</a:t>
+            </a:r>
+            <a:endParaRPr lang="en-US" altLang="ko-KR" b="1" dirty="0">
+              <a:solidFill>
+                <a:schemeClr val="bg1"/>
+              </a:solidFill>
+            </a:endParaRPr>
+          </a:p>
+          <a:p>
+            <a:pPr marL="342900" indent="-342900">
+              <a:buAutoNum type="arabicPeriod"/>
+            </a:pPr>
+            <a:r>
+              <a:rPr lang="ko-KR" altLang="en-US" b="1" dirty="0">
+                <a:solidFill>
+                  <a:schemeClr val="bg1"/>
+                </a:solidFill>
+              </a:rPr>
+              <a:t>중단에 그림을 </a:t>
+            </a:r>
+            <a:r>
+              <a:rPr lang="ko-KR" altLang="en-US" b="1" dirty="0" err="1">
+                <a:solidFill>
+                  <a:schemeClr val="bg1"/>
+                </a:solidFill>
+              </a:rPr>
+              <a:t>드래그하여</a:t>
+            </a:r>
+            <a:r>
+              <a:rPr lang="ko-KR" altLang="en-US" b="1" dirty="0">
+                <a:solidFill>
+                  <a:schemeClr val="bg1"/>
+                </a:solidFill>
+              </a:rPr>
+              <a:t> 스테이지 선택</a:t>
+            </a:r>
+            <a:endParaRPr lang="en-US" altLang="ko-KR" b="1" dirty="0">
+              <a:solidFill>
+                <a:schemeClr val="bg1"/>
+              </a:solidFill>
+            </a:endParaRPr>
+          </a:p>
+          <a:p>
+            <a:pPr marL="342900" indent="-342900">
+              <a:buAutoNum type="arabicPeriod"/>
+            </a:pPr>
+            <a:r>
+              <a:rPr lang="ko-KR" altLang="en-US" b="1" dirty="0" err="1">
+                <a:solidFill>
+                  <a:schemeClr val="bg1"/>
+                </a:solidFill>
+              </a:rPr>
+              <a:t>그림클릭시</a:t>
+            </a:r>
+            <a:r>
+              <a:rPr lang="ko-KR" altLang="en-US" b="1" dirty="0">
+                <a:solidFill>
+                  <a:schemeClr val="bg1"/>
+                </a:solidFill>
+              </a:rPr>
+              <a:t> 본 스테이지로 전환</a:t>
+            </a:r>
+            <a:endParaRPr lang="en-US" altLang="ko-KR" b="1" dirty="0">
+              <a:solidFill>
+                <a:schemeClr val="bg1"/>
+              </a:solidFill>
+            </a:endParaRPr>
+          </a:p>
+          <a:p>
+            <a:pPr marL="342900" indent="-342900">
+              <a:buAutoNum type="arabicPeriod"/>
+            </a:pPr>
+            <a:r>
+              <a:rPr lang="ko-KR" altLang="en-US" b="1" dirty="0" err="1">
+                <a:solidFill>
+                  <a:schemeClr val="bg1"/>
+                </a:solidFill>
+              </a:rPr>
+              <a:t>뒤로가기</a:t>
+            </a:r>
+            <a:r>
+              <a:rPr lang="ko-KR" altLang="en-US" b="1" dirty="0">
+                <a:solidFill>
+                  <a:schemeClr val="bg1"/>
+                </a:solidFill>
+              </a:rPr>
+              <a:t> </a:t>
+            </a:r>
+            <a:r>
+              <a:rPr lang="ko-KR" altLang="en-US" b="1" dirty="0" err="1">
+                <a:solidFill>
+                  <a:schemeClr val="bg1"/>
+                </a:solidFill>
+              </a:rPr>
+              <a:t>버튼눌렀을시에</a:t>
+            </a:r>
+            <a:r>
+              <a:rPr lang="ko-KR" altLang="en-US" b="1" dirty="0">
+                <a:solidFill>
+                  <a:schemeClr val="bg1"/>
+                </a:solidFill>
+              </a:rPr>
+              <a:t> 전화면 이동</a:t>
+            </a:r>
+            <a:endParaRPr lang="en-US" altLang="ko-KR" b="1" dirty="0">
+              <a:solidFill>
+                <a:schemeClr val="bg1"/>
+              </a:solidFill>
+            </a:endParaRPr>
+          </a:p>
+        </p:txBody>
+      </p:sp>
+    </p:spTree>
+    <p:extLst>
+      <p:ext uri="{BB962C8B-B14F-4D97-AF65-F5344CB8AC3E}">
+        <p14:creationId xmlns:p14="http://schemas.microsoft.com/office/powerpoint/2010/main" val="3077967786"/>
+      </p:ext>
+    </p:extLst>
+  </p:cSld>
+  <p:clrMapOvr>
+    <a:masterClrMapping/>
+  </p:clrMapOvr>
+</p:sld>
+</file>
+
+<file path=ppt/slides/slide4.xml><?xml version="1.0" encoding="utf-8"?>
+<p:sld xmlns:a="http://schemas.openxmlformats.org/drawingml/2006/main" xmlns:r="http://schemas.openxmlformats.org/officeDocument/2006/relationships" xmlns:p="http://schemas.openxmlformats.org/presentationml/2006/main">
+  <p:cSld>
+    <p:bg>
+      <p:bgPr>
+        <a:solidFill>
+          <a:schemeClr val="accent5"/>
+        </a:solidFill>
+        <a:effectLst/>
+      </p:bgPr>
+    </p:bg>
+    <p:spTree>
+      <p:nvGrpSpPr>
+        <p:cNvPr id="1" name=""/>
+        <p:cNvGrpSpPr/>
+        <p:nvPr/>
+      </p:nvGrpSpPr>
+      <p:grpSpPr>
+        <a:xfrm>
+          <a:off x="0" y="0"/>
+          <a:ext cx="0" cy="0"/>
+          <a:chOff x="0" y="0"/>
+          <a:chExt cx="0" cy="0"/>
+        </a:xfrm>
+      </p:grpSpPr>
+      <p:pic>
+        <p:nvPicPr>
+          <p:cNvPr id="3" name="그림 2">
+            <a:extLst>
+              <a:ext uri="{FF2B5EF4-FFF2-40B4-BE49-F238E27FC236}">
+                <a16:creationId xmlns:a16="http://schemas.microsoft.com/office/drawing/2014/main" id="{F942E20B-2BBE-EB54-C278-AF1B0369370F}"/>
+              </a:ext>
+            </a:extLst>
+          </p:cNvPr>
+          <p:cNvPicPr>
+            <a:picLocks noChangeAspect="1"/>
+          </p:cNvPicPr>
+          <p:nvPr/>
+        </p:nvPicPr>
+        <p:blipFill>
+          <a:blip r:embed="rId2"/>
+          <a:stretch>
+            <a:fillRect/>
+          </a:stretch>
+        </p:blipFill>
+        <p:spPr>
+          <a:xfrm>
+            <a:off x="3796351" y="645638"/>
+            <a:ext cx="4222078" cy="2314379"/>
+          </a:xfrm>
+          <a:prstGeom prst="rect">
+            <a:avLst/>
+          </a:prstGeom>
+        </p:spPr>
+      </p:pic>
+      <p:sp>
+        <p:nvSpPr>
+          <p:cNvPr id="5" name="TextBox 4">
+            <a:extLst>
+              <a:ext uri="{FF2B5EF4-FFF2-40B4-BE49-F238E27FC236}">
+                <a16:creationId xmlns:a16="http://schemas.microsoft.com/office/drawing/2014/main" id="{8AF88F40-BA02-3B4B-4297-028569216593}"/>
+              </a:ext>
+            </a:extLst>
+          </p:cNvPr>
+          <p:cNvSpPr txBox="1"/>
+          <p:nvPr/>
+        </p:nvSpPr>
+        <p:spPr>
+          <a:xfrm>
+            <a:off x="2229396" y="3897984"/>
+            <a:ext cx="7733207" cy="2031325"/>
+          </a:xfrm>
+          <a:prstGeom prst="rect">
+            <a:avLst/>
+          </a:prstGeom>
+          <a:noFill/>
+        </p:spPr>
+        <p:txBody>
+          <a:bodyPr wrap="none" rtlCol="0">
+            <a:spAutoFit/>
+          </a:bodyPr>
+          <a:lstStyle/>
+          <a:p>
+            <a:r>
+              <a:rPr lang="ko-KR" altLang="en-US" b="1" dirty="0" err="1">
+                <a:solidFill>
+                  <a:schemeClr val="bg1"/>
+                </a:solidFill>
+              </a:rPr>
+              <a:t>들어가는기능</a:t>
+            </a:r>
+            <a:endParaRPr lang="en-US" altLang="ko-KR" b="1" dirty="0">
+              <a:solidFill>
+                <a:schemeClr val="bg1"/>
+              </a:solidFill>
+            </a:endParaRPr>
+          </a:p>
+          <a:p>
+            <a:endParaRPr lang="en-US" altLang="ko-KR" b="1" dirty="0">
+              <a:solidFill>
+                <a:schemeClr val="bg1"/>
+              </a:solidFill>
+            </a:endParaRPr>
+          </a:p>
+          <a:p>
+            <a:pPr marL="342900" indent="-342900">
+              <a:buAutoNum type="arabicPeriod"/>
+            </a:pPr>
+            <a:r>
+              <a:rPr lang="ko-KR" altLang="en-US" b="1" dirty="0">
+                <a:solidFill>
+                  <a:schemeClr val="bg1"/>
+                </a:solidFill>
+              </a:rPr>
+              <a:t>난이도 설정을 누르고 스테이지 </a:t>
+            </a:r>
+            <a:r>
+              <a:rPr lang="ko-KR" altLang="en-US" b="1" dirty="0" err="1">
+                <a:solidFill>
+                  <a:schemeClr val="bg1"/>
+                </a:solidFill>
+              </a:rPr>
+              <a:t>클릭시</a:t>
+            </a:r>
+            <a:r>
+              <a:rPr lang="ko-KR" altLang="en-US" b="1" dirty="0">
+                <a:solidFill>
+                  <a:schemeClr val="bg1"/>
+                </a:solidFill>
+              </a:rPr>
+              <a:t> </a:t>
+            </a:r>
+            <a:r>
+              <a:rPr lang="ko-KR" altLang="en-US" b="1" dirty="0" err="1">
+                <a:solidFill>
+                  <a:schemeClr val="bg1"/>
+                </a:solidFill>
+              </a:rPr>
+              <a:t>맵전환</a:t>
+            </a:r>
+            <a:r>
+              <a:rPr lang="en-US" altLang="ko-KR" b="1" dirty="0">
+                <a:solidFill>
+                  <a:schemeClr val="bg1"/>
+                </a:solidFill>
+              </a:rPr>
+              <a:t>(</a:t>
+            </a:r>
+            <a:r>
+              <a:rPr lang="ko-KR" altLang="en-US" b="1" dirty="0">
+                <a:solidFill>
+                  <a:schemeClr val="bg1"/>
+                </a:solidFill>
+              </a:rPr>
+              <a:t>난이도에 따른 </a:t>
+            </a:r>
+            <a:r>
+              <a:rPr lang="ko-KR" altLang="en-US" b="1" dirty="0" err="1">
+                <a:solidFill>
+                  <a:schemeClr val="bg1"/>
+                </a:solidFill>
+              </a:rPr>
+              <a:t>맵변화</a:t>
+            </a:r>
+            <a:r>
+              <a:rPr lang="en-US" altLang="ko-KR" b="1" dirty="0">
+                <a:solidFill>
+                  <a:schemeClr val="bg1"/>
+                </a:solidFill>
+              </a:rPr>
+              <a:t>)</a:t>
+            </a:r>
+          </a:p>
+          <a:p>
+            <a:pPr marL="342900" indent="-342900">
+              <a:buAutoNum type="arabicPeriod"/>
+            </a:pPr>
+            <a:r>
+              <a:rPr lang="ko-KR" altLang="en-US" b="1" dirty="0">
+                <a:solidFill>
+                  <a:schemeClr val="bg1"/>
+                </a:solidFill>
+              </a:rPr>
+              <a:t>클리어 아닌 스테이지는 </a:t>
+            </a:r>
+            <a:r>
+              <a:rPr lang="ko-KR" altLang="en-US" b="1" dirty="0" err="1">
+                <a:solidFill>
+                  <a:schemeClr val="bg1"/>
+                </a:solidFill>
+              </a:rPr>
+              <a:t>잠금표시</a:t>
+            </a:r>
+            <a:endParaRPr lang="en-US" altLang="ko-KR" b="1" dirty="0">
+              <a:solidFill>
+                <a:schemeClr val="bg1"/>
+              </a:solidFill>
+            </a:endParaRPr>
+          </a:p>
+          <a:p>
+            <a:pPr marL="342900" indent="-342900">
+              <a:buAutoNum type="arabicPeriod"/>
+            </a:pPr>
+            <a:r>
+              <a:rPr lang="en-US" altLang="ko-KR" b="1" dirty="0">
+                <a:solidFill>
+                  <a:schemeClr val="bg1"/>
+                </a:solidFill>
+              </a:rPr>
+              <a:t>Easy</a:t>
+            </a:r>
+            <a:r>
+              <a:rPr lang="ko-KR" altLang="en-US" b="1" dirty="0" err="1">
+                <a:solidFill>
+                  <a:schemeClr val="bg1"/>
+                </a:solidFill>
+              </a:rPr>
+              <a:t>로깨면</a:t>
+            </a:r>
+            <a:r>
+              <a:rPr lang="ko-KR" altLang="en-US" b="1" dirty="0">
+                <a:solidFill>
+                  <a:schemeClr val="bg1"/>
+                </a:solidFill>
+              </a:rPr>
+              <a:t> </a:t>
+            </a:r>
+            <a:r>
+              <a:rPr lang="en-US" altLang="ko-KR" b="1" dirty="0">
+                <a:solidFill>
+                  <a:schemeClr val="bg1"/>
+                </a:solidFill>
+              </a:rPr>
+              <a:t>Easy , Hard</a:t>
+            </a:r>
+            <a:r>
+              <a:rPr lang="ko-KR" altLang="en-US" b="1" dirty="0" err="1">
+                <a:solidFill>
+                  <a:schemeClr val="bg1"/>
+                </a:solidFill>
+              </a:rPr>
+              <a:t>로깨면</a:t>
+            </a:r>
+            <a:r>
+              <a:rPr lang="ko-KR" altLang="en-US" b="1" dirty="0">
+                <a:solidFill>
+                  <a:schemeClr val="bg1"/>
+                </a:solidFill>
+              </a:rPr>
+              <a:t> </a:t>
+            </a:r>
+            <a:r>
+              <a:rPr lang="en-US" altLang="ko-KR" b="1" dirty="0">
+                <a:solidFill>
+                  <a:schemeClr val="bg1"/>
+                </a:solidFill>
+              </a:rPr>
+              <a:t>Hard, </a:t>
+            </a:r>
+            <a:r>
+              <a:rPr lang="ko-KR" altLang="en-US" b="1" dirty="0" err="1">
+                <a:solidFill>
+                  <a:schemeClr val="bg1"/>
+                </a:solidFill>
+              </a:rPr>
+              <a:t>둘다깨면</a:t>
+            </a:r>
+            <a:r>
+              <a:rPr lang="ko-KR" altLang="en-US" b="1" dirty="0">
+                <a:solidFill>
+                  <a:schemeClr val="bg1"/>
+                </a:solidFill>
+              </a:rPr>
+              <a:t> </a:t>
+            </a:r>
+            <a:r>
+              <a:rPr lang="en-US" altLang="ko-KR" b="1" dirty="0">
+                <a:solidFill>
+                  <a:schemeClr val="bg1"/>
+                </a:solidFill>
+              </a:rPr>
+              <a:t>Perfect</a:t>
+            </a:r>
+          </a:p>
+          <a:p>
+            <a:pPr marL="342900" indent="-342900">
+              <a:buAutoNum type="arabicPeriod"/>
+            </a:pPr>
+            <a:r>
+              <a:rPr lang="ko-KR" altLang="en-US" b="1" dirty="0" err="1">
+                <a:solidFill>
+                  <a:schemeClr val="bg1"/>
+                </a:solidFill>
+              </a:rPr>
+              <a:t>뒤로가기</a:t>
+            </a:r>
+            <a:r>
+              <a:rPr lang="ko-KR" altLang="en-US" b="1" dirty="0">
+                <a:solidFill>
+                  <a:schemeClr val="bg1"/>
+                </a:solidFill>
+              </a:rPr>
+              <a:t> </a:t>
+            </a:r>
+            <a:r>
+              <a:rPr lang="ko-KR" altLang="en-US" b="1" dirty="0" err="1">
+                <a:solidFill>
+                  <a:schemeClr val="bg1"/>
+                </a:solidFill>
+              </a:rPr>
+              <a:t>버튼누를시에</a:t>
+            </a:r>
+            <a:r>
+              <a:rPr lang="ko-KR" altLang="en-US" b="1" dirty="0">
+                <a:solidFill>
+                  <a:schemeClr val="bg1"/>
+                </a:solidFill>
+              </a:rPr>
+              <a:t> 전화면 이동</a:t>
+            </a:r>
+            <a:endParaRPr lang="en-US" altLang="ko-KR" b="1" dirty="0">
+              <a:solidFill>
+                <a:schemeClr val="bg1"/>
+              </a:solidFill>
+            </a:endParaRPr>
+          </a:p>
+          <a:p>
+            <a:pPr marL="342900" indent="-342900">
+              <a:buFontTx/>
+              <a:buAutoNum type="arabicPeriod"/>
+            </a:pPr>
+            <a:r>
+              <a:rPr lang="ko-KR" altLang="en-US" b="1" dirty="0">
+                <a:solidFill>
+                  <a:schemeClr val="bg1"/>
+                </a:solidFill>
+              </a:rPr>
+              <a:t>저장기능 </a:t>
+            </a:r>
+            <a:r>
+              <a:rPr lang="ko-KR" altLang="en-US" b="1" dirty="0" err="1">
+                <a:solidFill>
+                  <a:schemeClr val="bg1"/>
+                </a:solidFill>
+              </a:rPr>
+              <a:t>휴대폰을꺼도</a:t>
+            </a:r>
+            <a:r>
+              <a:rPr lang="ko-KR" altLang="en-US" b="1" dirty="0">
+                <a:solidFill>
+                  <a:schemeClr val="bg1"/>
+                </a:solidFill>
+              </a:rPr>
+              <a:t> </a:t>
+            </a:r>
+            <a:r>
+              <a:rPr lang="ko-KR" altLang="en-US" b="1" dirty="0" err="1">
+                <a:solidFill>
+                  <a:schemeClr val="bg1"/>
+                </a:solidFill>
+              </a:rPr>
+              <a:t>진행된정보가</a:t>
+            </a:r>
+            <a:r>
+              <a:rPr lang="ko-KR" altLang="en-US" b="1" dirty="0">
+                <a:solidFill>
+                  <a:schemeClr val="bg1"/>
+                </a:solidFill>
+              </a:rPr>
+              <a:t> 저장</a:t>
+            </a:r>
+            <a:endParaRPr lang="en-US" altLang="ko-KR" b="1" dirty="0">
+              <a:solidFill>
+                <a:schemeClr val="bg1"/>
+              </a:solidFill>
+            </a:endParaRPr>
+          </a:p>
+        </p:txBody>
+      </p:sp>
+    </p:spTree>
+    <p:extLst>
+      <p:ext uri="{BB962C8B-B14F-4D97-AF65-F5344CB8AC3E}">
+        <p14:creationId xmlns:p14="http://schemas.microsoft.com/office/powerpoint/2010/main" val="565122437"/>
+      </p:ext>
+    </p:extLst>
+  </p:cSld>
+  <p:clrMapOvr>
+    <a:masterClrMapping/>
+  </p:clrMapOvr>
+</p:sld>
+</file>
+
+<file path=ppt/slides/slide5.xml><?xml version="1.0" encoding="utf-8"?>
+<p:sld xmlns:a="http://schemas.openxmlformats.org/drawingml/2006/main" xmlns:r="http://schemas.openxmlformats.org/officeDocument/2006/relationships" xmlns:p="http://schemas.openxmlformats.org/presentationml/2006/main">
+  <p:cSld>
+    <p:bg>
+      <p:bgPr>
+        <a:solidFill>
+          <a:schemeClr val="accent5"/>
+        </a:solidFill>
+        <a:effectLst/>
+      </p:bgPr>
+    </p:bg>
+    <p:spTree>
+      <p:nvGrpSpPr>
+        <p:cNvPr id="1" name=""/>
+        <p:cNvGrpSpPr/>
+        <p:nvPr/>
+      </p:nvGrpSpPr>
+      <p:grpSpPr>
+        <a:xfrm>
+          <a:off x="0" y="0"/>
+          <a:ext cx="0" cy="0"/>
+          <a:chOff x="0" y="0"/>
+          <a:chExt cx="0" cy="0"/>
+        </a:xfrm>
+      </p:grpSpPr>
+      <p:pic>
+        <p:nvPicPr>
+          <p:cNvPr id="6" name="그림 5">
+            <a:extLst>
+              <a:ext uri="{FF2B5EF4-FFF2-40B4-BE49-F238E27FC236}">
+                <a16:creationId xmlns:a16="http://schemas.microsoft.com/office/drawing/2014/main" id="{7D4AD190-CE95-F022-A28F-598295C6967F}"/>
+              </a:ext>
+            </a:extLst>
+          </p:cNvPr>
+          <p:cNvPicPr>
+            <a:picLocks noChangeAspect="1"/>
+          </p:cNvPicPr>
+          <p:nvPr/>
+        </p:nvPicPr>
+        <p:blipFill>
+          <a:blip r:embed="rId2"/>
+          <a:stretch>
+            <a:fillRect/>
+          </a:stretch>
+        </p:blipFill>
+        <p:spPr>
+          <a:xfrm>
+            <a:off x="3071424" y="726958"/>
+            <a:ext cx="4997059" cy="2432596"/>
+          </a:xfrm>
+          <a:prstGeom prst="rect">
+            <a:avLst/>
+          </a:prstGeom>
+        </p:spPr>
+      </p:pic>
+      <p:sp>
+        <p:nvSpPr>
+          <p:cNvPr id="7" name="TextBox 6">
+            <a:extLst>
+              <a:ext uri="{FF2B5EF4-FFF2-40B4-BE49-F238E27FC236}">
+                <a16:creationId xmlns:a16="http://schemas.microsoft.com/office/drawing/2014/main" id="{AC5A0F08-CE66-8B9B-9468-CF00B5CB3EEC}"/>
+              </a:ext>
+            </a:extLst>
+          </p:cNvPr>
+          <p:cNvSpPr txBox="1"/>
+          <p:nvPr/>
+        </p:nvSpPr>
+        <p:spPr>
+          <a:xfrm>
+            <a:off x="1957139" y="3855464"/>
+            <a:ext cx="7376186" cy="1754326"/>
+          </a:xfrm>
+          <a:prstGeom prst="rect">
+            <a:avLst/>
+          </a:prstGeom>
+          <a:noFill/>
+        </p:spPr>
+        <p:txBody>
+          <a:bodyPr wrap="none" rtlCol="0">
+            <a:spAutoFit/>
+          </a:bodyPr>
+          <a:lstStyle/>
+          <a:p>
+            <a:r>
+              <a:rPr lang="ko-KR" altLang="en-US" b="1" dirty="0" err="1">
+                <a:solidFill>
+                  <a:schemeClr val="bg1"/>
+                </a:solidFill>
+              </a:rPr>
+              <a:t>들어가는기능</a:t>
+            </a:r>
+            <a:endParaRPr lang="en-US" altLang="ko-KR" b="1" dirty="0">
+              <a:solidFill>
+                <a:schemeClr val="bg1"/>
+              </a:solidFill>
+            </a:endParaRPr>
+          </a:p>
+          <a:p>
+            <a:endParaRPr lang="en-US" altLang="ko-KR" b="1" dirty="0">
+              <a:solidFill>
+                <a:schemeClr val="bg1"/>
+              </a:solidFill>
+            </a:endParaRPr>
+          </a:p>
+          <a:p>
+            <a:pPr marL="342900" indent="-342900">
+              <a:buAutoNum type="arabicPeriod"/>
+            </a:pPr>
+            <a:r>
+              <a:rPr lang="ko-KR" altLang="en-US" b="1" dirty="0" err="1">
+                <a:solidFill>
+                  <a:schemeClr val="bg1"/>
+                </a:solidFill>
+              </a:rPr>
+              <a:t>뒤로가기</a:t>
+            </a:r>
+            <a:r>
+              <a:rPr lang="ko-KR" altLang="en-US" b="1" dirty="0">
+                <a:solidFill>
+                  <a:schemeClr val="bg1"/>
+                </a:solidFill>
+              </a:rPr>
+              <a:t> 버튼 </a:t>
+            </a:r>
+            <a:r>
+              <a:rPr lang="ko-KR" altLang="en-US" b="1" dirty="0" err="1">
+                <a:solidFill>
+                  <a:schemeClr val="bg1"/>
+                </a:solidFill>
+              </a:rPr>
+              <a:t>클릭시</a:t>
+            </a:r>
+            <a:r>
+              <a:rPr lang="ko-KR" altLang="en-US" b="1" dirty="0">
+                <a:solidFill>
+                  <a:schemeClr val="bg1"/>
+                </a:solidFill>
+              </a:rPr>
+              <a:t> </a:t>
+            </a:r>
+            <a:r>
+              <a:rPr lang="en-US" altLang="ko-KR" b="1" dirty="0">
+                <a:solidFill>
+                  <a:schemeClr val="bg1"/>
+                </a:solidFill>
+              </a:rPr>
+              <a:t>ESC</a:t>
+            </a:r>
+            <a:r>
+              <a:rPr lang="ko-KR" altLang="en-US" b="1" dirty="0" err="1">
+                <a:solidFill>
+                  <a:schemeClr val="bg1"/>
+                </a:solidFill>
+              </a:rPr>
+              <a:t>화면나옴</a:t>
+            </a:r>
+            <a:endParaRPr lang="en-US" altLang="ko-KR" b="1" dirty="0">
+              <a:solidFill>
+                <a:schemeClr val="bg1"/>
+              </a:solidFill>
+            </a:endParaRPr>
+          </a:p>
+          <a:p>
+            <a:pPr marL="342900" indent="-342900">
+              <a:buAutoNum type="arabicPeriod"/>
+            </a:pPr>
+            <a:r>
+              <a:rPr lang="en-US" altLang="ko-KR" b="1" dirty="0">
+                <a:solidFill>
+                  <a:schemeClr val="bg1"/>
+                </a:solidFill>
+              </a:rPr>
+              <a:t>Home</a:t>
+            </a:r>
+            <a:r>
+              <a:rPr lang="ko-KR" altLang="en-US" b="1" dirty="0">
+                <a:solidFill>
+                  <a:schemeClr val="bg1"/>
+                </a:solidFill>
+              </a:rPr>
+              <a:t>버튼 </a:t>
+            </a:r>
+            <a:r>
+              <a:rPr lang="ko-KR" altLang="en-US" b="1" dirty="0" err="1">
+                <a:solidFill>
+                  <a:schemeClr val="bg1"/>
+                </a:solidFill>
+              </a:rPr>
+              <a:t>클릭시</a:t>
+            </a:r>
+            <a:r>
+              <a:rPr lang="ko-KR" altLang="en-US" b="1" dirty="0">
+                <a:solidFill>
+                  <a:schemeClr val="bg1"/>
+                </a:solidFill>
+              </a:rPr>
+              <a:t> </a:t>
+            </a:r>
+            <a:r>
+              <a:rPr lang="ko-KR" altLang="en-US" b="1" dirty="0" err="1">
+                <a:solidFill>
+                  <a:schemeClr val="bg1"/>
+                </a:solidFill>
+              </a:rPr>
+              <a:t>메인화면으로</a:t>
+            </a:r>
+            <a:r>
+              <a:rPr lang="ko-KR" altLang="en-US" b="1" dirty="0">
+                <a:solidFill>
+                  <a:schemeClr val="bg1"/>
+                </a:solidFill>
+              </a:rPr>
+              <a:t> 이동</a:t>
+            </a:r>
+            <a:endParaRPr lang="en-US" altLang="ko-KR" b="1" dirty="0">
+              <a:solidFill>
+                <a:schemeClr val="bg1"/>
+              </a:solidFill>
+            </a:endParaRPr>
+          </a:p>
+          <a:p>
+            <a:pPr marL="342900" indent="-342900">
+              <a:buAutoNum type="arabicPeriod"/>
+            </a:pPr>
+            <a:r>
+              <a:rPr lang="en-US" altLang="ko-KR" b="1" dirty="0">
+                <a:solidFill>
+                  <a:schemeClr val="bg1"/>
+                </a:solidFill>
+              </a:rPr>
+              <a:t>Retry</a:t>
+            </a:r>
+            <a:r>
+              <a:rPr lang="ko-KR" altLang="en-US" b="1" dirty="0">
+                <a:solidFill>
+                  <a:schemeClr val="bg1"/>
+                </a:solidFill>
+              </a:rPr>
+              <a:t>시 </a:t>
+            </a:r>
+            <a:r>
+              <a:rPr lang="ko-KR" altLang="en-US" b="1" dirty="0" err="1">
+                <a:solidFill>
+                  <a:schemeClr val="bg1"/>
+                </a:solidFill>
+              </a:rPr>
+              <a:t>맵을</a:t>
+            </a:r>
+            <a:r>
+              <a:rPr lang="ko-KR" altLang="en-US" b="1" dirty="0">
+                <a:solidFill>
+                  <a:schemeClr val="bg1"/>
+                </a:solidFill>
+              </a:rPr>
+              <a:t> 로드를 </a:t>
+            </a:r>
+            <a:r>
+              <a:rPr lang="ko-KR" altLang="en-US" b="1" dirty="0" err="1">
+                <a:solidFill>
+                  <a:schemeClr val="bg1"/>
+                </a:solidFill>
+              </a:rPr>
+              <a:t>시키는게아닌</a:t>
+            </a:r>
+            <a:r>
+              <a:rPr lang="ko-KR" altLang="en-US" b="1" dirty="0">
+                <a:solidFill>
+                  <a:schemeClr val="bg1"/>
+                </a:solidFill>
+              </a:rPr>
+              <a:t> 플레이어를 죽여서 </a:t>
+            </a:r>
+            <a:r>
+              <a:rPr lang="ko-KR" altLang="en-US" b="1" dirty="0" err="1">
+                <a:solidFill>
+                  <a:schemeClr val="bg1"/>
+                </a:solidFill>
+              </a:rPr>
+              <a:t>다시시작함</a:t>
+            </a:r>
+            <a:endParaRPr lang="en-US" altLang="ko-KR" b="1" dirty="0">
+              <a:solidFill>
+                <a:schemeClr val="bg1"/>
+              </a:solidFill>
+            </a:endParaRPr>
+          </a:p>
+          <a:p>
+            <a:pPr marL="342900" indent="-342900">
+              <a:buAutoNum type="arabicPeriod"/>
+            </a:pPr>
+            <a:r>
+              <a:rPr lang="ko-KR" altLang="en-US" b="1" dirty="0" err="1">
+                <a:solidFill>
+                  <a:schemeClr val="bg1"/>
+                </a:solidFill>
+              </a:rPr>
+              <a:t>한번더</a:t>
+            </a:r>
+            <a:r>
+              <a:rPr lang="ko-KR" altLang="en-US" b="1" dirty="0">
+                <a:solidFill>
+                  <a:schemeClr val="bg1"/>
+                </a:solidFill>
+              </a:rPr>
+              <a:t> </a:t>
+            </a:r>
+            <a:r>
+              <a:rPr lang="ko-KR" altLang="en-US" b="1" dirty="0" err="1">
+                <a:solidFill>
+                  <a:schemeClr val="bg1"/>
+                </a:solidFill>
+              </a:rPr>
+              <a:t>뒤로가기</a:t>
+            </a:r>
+            <a:r>
+              <a:rPr lang="ko-KR" altLang="en-US" b="1" dirty="0">
+                <a:solidFill>
+                  <a:schemeClr val="bg1"/>
+                </a:solidFill>
+              </a:rPr>
+              <a:t> </a:t>
+            </a:r>
+            <a:r>
+              <a:rPr lang="ko-KR" altLang="en-US" b="1" dirty="0" err="1">
+                <a:solidFill>
+                  <a:schemeClr val="bg1"/>
+                </a:solidFill>
+              </a:rPr>
+              <a:t>버튼클릭시</a:t>
+            </a:r>
+            <a:r>
+              <a:rPr lang="ko-KR" altLang="en-US" b="1" dirty="0">
+                <a:solidFill>
+                  <a:schemeClr val="bg1"/>
+                </a:solidFill>
+              </a:rPr>
+              <a:t> </a:t>
+            </a:r>
+            <a:r>
+              <a:rPr lang="en-US" altLang="ko-KR" b="1" dirty="0">
+                <a:solidFill>
+                  <a:schemeClr val="bg1"/>
+                </a:solidFill>
+              </a:rPr>
+              <a:t>UI</a:t>
+            </a:r>
+            <a:r>
+              <a:rPr lang="ko-KR" altLang="en-US" b="1" dirty="0">
+                <a:solidFill>
+                  <a:schemeClr val="bg1"/>
+                </a:solidFill>
+              </a:rPr>
+              <a:t>사라짐</a:t>
+            </a:r>
+            <a:endParaRPr lang="en-US" altLang="ko-KR" b="1" dirty="0">
+              <a:solidFill>
+                <a:schemeClr val="bg1"/>
+              </a:solidFill>
+            </a:endParaRPr>
+          </a:p>
+        </p:txBody>
+      </p:sp>
+    </p:spTree>
+    <p:extLst>
+      <p:ext uri="{BB962C8B-B14F-4D97-AF65-F5344CB8AC3E}">
+        <p14:creationId xmlns:p14="http://schemas.microsoft.com/office/powerpoint/2010/main" val="2027008615"/>
+      </p:ext>
+    </p:extLst>
+  </p:cSld>
+  <p:clrMapOvr>
+    <a:masterClrMapping/>
+  </p:clrMapOvr>
+</p:sld>
+</file>
+
+<file path=ppt/slides/slide6.xml><?xml version="1.0" encoding="utf-8"?>
+<p:sld xmlns:a="http://schemas.openxmlformats.org/drawingml/2006/main" xmlns:r="http://schemas.openxmlformats.org/officeDocument/2006/relationships" xmlns:p="http://schemas.openxmlformats.org/presentationml/2006/main">
+  <p:cSld>
+    <p:bg>
+      <p:bgPr>
+        <a:solidFill>
+          <a:schemeClr val="accent5"/>
+        </a:solidFill>
+        <a:effectLst/>
+      </p:bgPr>
+    </p:bg>
+    <p:spTree>
+      <p:nvGrpSpPr>
+        <p:cNvPr id="1" name=""/>
+        <p:cNvGrpSpPr/>
+        <p:nvPr/>
+      </p:nvGrpSpPr>
+      <p:grpSpPr>
+        <a:xfrm>
+          <a:off x="0" y="0"/>
+          <a:ext cx="0" cy="0"/>
+          <a:chOff x="0" y="0"/>
+          <a:chExt cx="0" cy="0"/>
+        </a:xfrm>
+      </p:grpSpPr>
+      <p:pic>
+        <p:nvPicPr>
+          <p:cNvPr id="5" name="그림 4">
+            <a:extLst>
+              <a:ext uri="{FF2B5EF4-FFF2-40B4-BE49-F238E27FC236}">
+                <a16:creationId xmlns:a16="http://schemas.microsoft.com/office/drawing/2014/main" id="{231A0A9B-6B2A-2D47-2F0D-1590912AEF21}"/>
+              </a:ext>
+            </a:extLst>
+          </p:cNvPr>
+          <p:cNvPicPr>
+            <a:picLocks noChangeAspect="1"/>
+          </p:cNvPicPr>
+          <p:nvPr/>
+        </p:nvPicPr>
+        <p:blipFill>
+          <a:blip r:embed="rId2"/>
+          <a:stretch>
+            <a:fillRect/>
+          </a:stretch>
+        </p:blipFill>
+        <p:spPr>
+          <a:xfrm>
+            <a:off x="219868" y="351710"/>
+            <a:ext cx="3818901" cy="2128116"/>
+          </a:xfrm>
+          <a:prstGeom prst="rect">
+            <a:avLst/>
+          </a:prstGeom>
+        </p:spPr>
+      </p:pic>
+      <p:pic>
+        <p:nvPicPr>
+          <p:cNvPr id="7" name="그림 6">
+            <a:extLst>
+              <a:ext uri="{FF2B5EF4-FFF2-40B4-BE49-F238E27FC236}">
+                <a16:creationId xmlns:a16="http://schemas.microsoft.com/office/drawing/2014/main" id="{24014BE4-C09E-5380-EE2B-9B4838ADB237}"/>
+              </a:ext>
+            </a:extLst>
+          </p:cNvPr>
+          <p:cNvPicPr>
+            <a:picLocks noChangeAspect="1"/>
+          </p:cNvPicPr>
+          <p:nvPr/>
+        </p:nvPicPr>
+        <p:blipFill>
+          <a:blip r:embed="rId3"/>
+          <a:stretch>
+            <a:fillRect/>
+          </a:stretch>
+        </p:blipFill>
+        <p:spPr>
+          <a:xfrm>
+            <a:off x="5902036" y="618836"/>
+            <a:ext cx="841564" cy="732472"/>
+          </a:xfrm>
+          <a:prstGeom prst="rect">
+            <a:avLst/>
+          </a:prstGeom>
+        </p:spPr>
+      </p:pic>
+      <p:pic>
+        <p:nvPicPr>
+          <p:cNvPr id="9" name="그림 8">
+            <a:extLst>
+              <a:ext uri="{FF2B5EF4-FFF2-40B4-BE49-F238E27FC236}">
+                <a16:creationId xmlns:a16="http://schemas.microsoft.com/office/drawing/2014/main" id="{04907165-76DD-032B-19BF-DF242C59FFAF}"/>
+              </a:ext>
+            </a:extLst>
+          </p:cNvPr>
+          <p:cNvPicPr>
+            <a:picLocks noChangeAspect="1"/>
+          </p:cNvPicPr>
+          <p:nvPr/>
+        </p:nvPicPr>
+        <p:blipFill>
+          <a:blip r:embed="rId4"/>
+          <a:stretch>
+            <a:fillRect/>
+          </a:stretch>
+        </p:blipFill>
+        <p:spPr>
+          <a:xfrm>
+            <a:off x="5941601" y="2211295"/>
+            <a:ext cx="897449" cy="946624"/>
+          </a:xfrm>
+          <a:prstGeom prst="rect">
+            <a:avLst/>
+          </a:prstGeom>
+        </p:spPr>
+      </p:pic>
+      <p:pic>
+        <p:nvPicPr>
+          <p:cNvPr id="11" name="그림 10">
+            <a:extLst>
+              <a:ext uri="{FF2B5EF4-FFF2-40B4-BE49-F238E27FC236}">
+                <a16:creationId xmlns:a16="http://schemas.microsoft.com/office/drawing/2014/main" id="{67FEE947-A533-1AEC-A823-AA053F68ABE3}"/>
+              </a:ext>
+            </a:extLst>
+          </p:cNvPr>
+          <p:cNvPicPr>
+            <a:picLocks noChangeAspect="1"/>
+          </p:cNvPicPr>
+          <p:nvPr/>
+        </p:nvPicPr>
+        <p:blipFill>
+          <a:blip r:embed="rId5"/>
+          <a:stretch>
+            <a:fillRect/>
+          </a:stretch>
+        </p:blipFill>
+        <p:spPr>
+          <a:xfrm>
+            <a:off x="6954372" y="4543125"/>
+            <a:ext cx="1188378" cy="1426054"/>
+          </a:xfrm>
+          <a:prstGeom prst="rect">
+            <a:avLst/>
+          </a:prstGeom>
+        </p:spPr>
+      </p:pic>
+      <p:pic>
+        <p:nvPicPr>
+          <p:cNvPr id="13" name="그림 12">
+            <a:extLst>
+              <a:ext uri="{FF2B5EF4-FFF2-40B4-BE49-F238E27FC236}">
+                <a16:creationId xmlns:a16="http://schemas.microsoft.com/office/drawing/2014/main" id="{9FFB1C1F-7F08-8EC1-B2B3-0B1F9C161239}"/>
+              </a:ext>
+            </a:extLst>
+          </p:cNvPr>
+          <p:cNvPicPr>
+            <a:picLocks noChangeAspect="1"/>
+          </p:cNvPicPr>
+          <p:nvPr/>
+        </p:nvPicPr>
+        <p:blipFill>
+          <a:blip r:embed="rId6"/>
+          <a:stretch>
+            <a:fillRect/>
+          </a:stretch>
+        </p:blipFill>
+        <p:spPr>
+          <a:xfrm>
+            <a:off x="7685810" y="826266"/>
+            <a:ext cx="4109027" cy="525042"/>
+          </a:xfrm>
+          <a:prstGeom prst="rect">
+            <a:avLst/>
+          </a:prstGeom>
+        </p:spPr>
+      </p:pic>
+      <p:pic>
+        <p:nvPicPr>
+          <p:cNvPr id="15" name="그림 14">
+            <a:extLst>
+              <a:ext uri="{FF2B5EF4-FFF2-40B4-BE49-F238E27FC236}">
+                <a16:creationId xmlns:a16="http://schemas.microsoft.com/office/drawing/2014/main" id="{FF39B667-7ED0-6593-81BB-13A25D523726}"/>
+              </a:ext>
+            </a:extLst>
+          </p:cNvPr>
+          <p:cNvPicPr>
+            <a:picLocks noChangeAspect="1"/>
+          </p:cNvPicPr>
+          <p:nvPr/>
+        </p:nvPicPr>
+        <p:blipFill>
+          <a:blip r:embed="rId7"/>
+          <a:stretch>
+            <a:fillRect/>
+          </a:stretch>
+        </p:blipFill>
+        <p:spPr>
+          <a:xfrm>
+            <a:off x="7937212" y="2167647"/>
+            <a:ext cx="3857625" cy="1666875"/>
+          </a:xfrm>
+          <a:prstGeom prst="rect">
+            <a:avLst/>
+          </a:prstGeom>
+        </p:spPr>
+      </p:pic>
+      <p:sp>
+        <p:nvSpPr>
+          <p:cNvPr id="16" name="TextBox 15">
+            <a:extLst>
+              <a:ext uri="{FF2B5EF4-FFF2-40B4-BE49-F238E27FC236}">
+                <a16:creationId xmlns:a16="http://schemas.microsoft.com/office/drawing/2014/main" id="{9EC4769A-EC4E-D33C-C0FD-3E51542628DE}"/>
+              </a:ext>
+            </a:extLst>
+          </p:cNvPr>
+          <p:cNvSpPr txBox="1"/>
+          <p:nvPr/>
+        </p:nvSpPr>
+        <p:spPr>
+          <a:xfrm>
+            <a:off x="1486597" y="2675870"/>
+            <a:ext cx="1107996" cy="369332"/>
+          </a:xfrm>
+          <a:prstGeom prst="rect">
+            <a:avLst/>
+          </a:prstGeom>
+          <a:noFill/>
+        </p:spPr>
+        <p:txBody>
+          <a:bodyPr wrap="none" rtlCol="0">
+            <a:spAutoFit/>
+          </a:bodyPr>
+          <a:lstStyle/>
+          <a:p>
+            <a:r>
+              <a:rPr lang="ko-KR" altLang="en-US" dirty="0"/>
+              <a:t>전체화면</a:t>
+            </a:r>
+          </a:p>
+        </p:txBody>
+      </p:sp>
+      <p:sp>
+        <p:nvSpPr>
+          <p:cNvPr id="17" name="TextBox 16">
+            <a:extLst>
+              <a:ext uri="{FF2B5EF4-FFF2-40B4-BE49-F238E27FC236}">
+                <a16:creationId xmlns:a16="http://schemas.microsoft.com/office/drawing/2014/main" id="{C7C369C9-350A-1559-2552-CC253C1C1806}"/>
+              </a:ext>
+            </a:extLst>
+          </p:cNvPr>
+          <p:cNvSpPr txBox="1"/>
+          <p:nvPr/>
+        </p:nvSpPr>
+        <p:spPr>
+          <a:xfrm>
+            <a:off x="5962814" y="1415768"/>
+            <a:ext cx="646331" cy="369332"/>
+          </a:xfrm>
+          <a:prstGeom prst="rect">
+            <a:avLst/>
+          </a:prstGeom>
+          <a:noFill/>
+        </p:spPr>
+        <p:txBody>
+          <a:bodyPr wrap="none" rtlCol="0">
+            <a:spAutoFit/>
+          </a:bodyPr>
+          <a:lstStyle/>
+          <a:p>
+            <a:r>
+              <a:rPr lang="ko-KR" altLang="en-US" dirty="0"/>
+              <a:t>점수</a:t>
+            </a:r>
+          </a:p>
+        </p:txBody>
+      </p:sp>
+      <p:sp>
+        <p:nvSpPr>
+          <p:cNvPr id="18" name="TextBox 17">
+            <a:extLst>
+              <a:ext uri="{FF2B5EF4-FFF2-40B4-BE49-F238E27FC236}">
+                <a16:creationId xmlns:a16="http://schemas.microsoft.com/office/drawing/2014/main" id="{6AFC3A8D-1182-1D6E-0F22-1F0744B5256D}"/>
+              </a:ext>
+            </a:extLst>
+          </p:cNvPr>
+          <p:cNvSpPr txBox="1"/>
+          <p:nvPr/>
+        </p:nvSpPr>
+        <p:spPr>
+          <a:xfrm>
+            <a:off x="8802405" y="1494278"/>
+            <a:ext cx="1875835" cy="369332"/>
+          </a:xfrm>
+          <a:prstGeom prst="rect">
+            <a:avLst/>
+          </a:prstGeom>
+          <a:noFill/>
+        </p:spPr>
+        <p:txBody>
+          <a:bodyPr wrap="none" rtlCol="0">
+            <a:spAutoFit/>
+          </a:bodyPr>
+          <a:lstStyle/>
+          <a:p>
+            <a:r>
+              <a:rPr lang="ko-KR" altLang="en-US" dirty="0"/>
+              <a:t>플레이어 이동</a:t>
+            </a:r>
+            <a:r>
+              <a:rPr lang="en-US" altLang="ko-KR" dirty="0"/>
+              <a:t>UI</a:t>
+            </a:r>
+            <a:endParaRPr lang="ko-KR" altLang="en-US" dirty="0"/>
+          </a:p>
+        </p:txBody>
+      </p:sp>
+      <p:sp>
+        <p:nvSpPr>
+          <p:cNvPr id="19" name="TextBox 18">
+            <a:extLst>
+              <a:ext uri="{FF2B5EF4-FFF2-40B4-BE49-F238E27FC236}">
+                <a16:creationId xmlns:a16="http://schemas.microsoft.com/office/drawing/2014/main" id="{EF090B59-6814-214D-4C17-90E124107EAA}"/>
+              </a:ext>
+            </a:extLst>
+          </p:cNvPr>
+          <p:cNvSpPr txBox="1"/>
+          <p:nvPr/>
+        </p:nvSpPr>
+        <p:spPr>
+          <a:xfrm>
+            <a:off x="5378669" y="3330750"/>
+            <a:ext cx="2023311" cy="369332"/>
+          </a:xfrm>
+          <a:prstGeom prst="rect">
+            <a:avLst/>
+          </a:prstGeom>
+          <a:noFill/>
+        </p:spPr>
+        <p:txBody>
+          <a:bodyPr wrap="none" rtlCol="0">
+            <a:spAutoFit/>
+          </a:bodyPr>
+          <a:lstStyle/>
+          <a:p>
+            <a:r>
+              <a:rPr lang="ko-KR" altLang="en-US"/>
+              <a:t>오브젝트</a:t>
+            </a:r>
+            <a:r>
+              <a:rPr lang="en-US" altLang="ko-KR" dirty="0"/>
+              <a:t>(</a:t>
+            </a:r>
+            <a:r>
+              <a:rPr lang="ko-KR" altLang="en-US" dirty="0"/>
+              <a:t>그냥 돌</a:t>
+            </a:r>
+            <a:r>
+              <a:rPr lang="en-US" altLang="ko-KR" dirty="0"/>
+              <a:t>)</a:t>
+            </a:r>
+            <a:endParaRPr lang="ko-KR" altLang="en-US" dirty="0"/>
+          </a:p>
+        </p:txBody>
+      </p:sp>
+      <p:sp>
+        <p:nvSpPr>
+          <p:cNvPr id="20" name="TextBox 19">
+            <a:extLst>
+              <a:ext uri="{FF2B5EF4-FFF2-40B4-BE49-F238E27FC236}">
+                <a16:creationId xmlns:a16="http://schemas.microsoft.com/office/drawing/2014/main" id="{922D5E1B-23FD-FAE0-5E98-424B03936980}"/>
+              </a:ext>
+            </a:extLst>
+          </p:cNvPr>
+          <p:cNvSpPr txBox="1"/>
+          <p:nvPr/>
+        </p:nvSpPr>
+        <p:spPr>
+          <a:xfrm>
+            <a:off x="8224939" y="4023187"/>
+            <a:ext cx="3426131" cy="369332"/>
+          </a:xfrm>
+          <a:prstGeom prst="rect">
+            <a:avLst/>
+          </a:prstGeom>
+          <a:noFill/>
+        </p:spPr>
+        <p:txBody>
+          <a:bodyPr wrap="none" rtlCol="0">
+            <a:spAutoFit/>
+          </a:bodyPr>
+          <a:lstStyle/>
+          <a:p>
+            <a:r>
+              <a:rPr lang="ko-KR" altLang="en-US" dirty="0" err="1"/>
+              <a:t>뒷배경</a:t>
+            </a:r>
+            <a:r>
+              <a:rPr lang="en-US" altLang="ko-KR" dirty="0"/>
+              <a:t>(</a:t>
+            </a:r>
+            <a:r>
+              <a:rPr lang="en-US" altLang="ko-KR" dirty="0" err="1"/>
+              <a:t>SkyBox</a:t>
+            </a:r>
+            <a:r>
+              <a:rPr lang="en-US" altLang="ko-KR" dirty="0"/>
+              <a:t> or UI or Object)</a:t>
+            </a:r>
+            <a:endParaRPr lang="ko-KR" altLang="en-US" dirty="0"/>
+          </a:p>
+        </p:txBody>
+      </p:sp>
+      <p:sp>
+        <p:nvSpPr>
+          <p:cNvPr id="21" name="TextBox 20">
+            <a:extLst>
+              <a:ext uri="{FF2B5EF4-FFF2-40B4-BE49-F238E27FC236}">
+                <a16:creationId xmlns:a16="http://schemas.microsoft.com/office/drawing/2014/main" id="{FD2BF0EE-00A3-9628-A16F-496333E858AB}"/>
+              </a:ext>
+            </a:extLst>
+          </p:cNvPr>
+          <p:cNvSpPr txBox="1"/>
+          <p:nvPr/>
+        </p:nvSpPr>
+        <p:spPr>
+          <a:xfrm>
+            <a:off x="7068634" y="6156098"/>
+            <a:ext cx="1107996" cy="369332"/>
+          </a:xfrm>
+          <a:prstGeom prst="rect">
+            <a:avLst/>
+          </a:prstGeom>
+          <a:noFill/>
+        </p:spPr>
+        <p:txBody>
+          <a:bodyPr wrap="none" rtlCol="0">
+            <a:spAutoFit/>
+          </a:bodyPr>
+          <a:lstStyle/>
+          <a:p>
+            <a:r>
+              <a:rPr lang="ko-KR" altLang="en-US" dirty="0"/>
+              <a:t>플레이어</a:t>
+            </a:r>
+          </a:p>
+        </p:txBody>
+      </p:sp>
+      <p:sp>
+        <p:nvSpPr>
+          <p:cNvPr id="22" name="TextBox 21">
+            <a:extLst>
+              <a:ext uri="{FF2B5EF4-FFF2-40B4-BE49-F238E27FC236}">
+                <a16:creationId xmlns:a16="http://schemas.microsoft.com/office/drawing/2014/main" id="{EFB91DB0-E12A-8EE9-A72C-FF0BA9388A50}"/>
+              </a:ext>
+            </a:extLst>
+          </p:cNvPr>
+          <p:cNvSpPr txBox="1"/>
+          <p:nvPr/>
+        </p:nvSpPr>
+        <p:spPr>
+          <a:xfrm>
+            <a:off x="444642" y="4494105"/>
+            <a:ext cx="5041765" cy="2031325"/>
+          </a:xfrm>
+          <a:prstGeom prst="rect">
+            <a:avLst/>
+          </a:prstGeom>
+          <a:noFill/>
+        </p:spPr>
+        <p:txBody>
+          <a:bodyPr wrap="none" rtlCol="0">
+            <a:spAutoFit/>
+          </a:bodyPr>
+          <a:lstStyle/>
+          <a:p>
+            <a:r>
+              <a:rPr lang="ko-KR" altLang="en-US" b="1" dirty="0" err="1">
+                <a:solidFill>
+                  <a:schemeClr val="bg1"/>
+                </a:solidFill>
+              </a:rPr>
+              <a:t>들어가는기능</a:t>
+            </a:r>
+            <a:endParaRPr lang="en-US" altLang="ko-KR" b="1" dirty="0">
+              <a:solidFill>
+                <a:schemeClr val="bg1"/>
+              </a:solidFill>
+            </a:endParaRPr>
+          </a:p>
+          <a:p>
+            <a:endParaRPr lang="en-US" altLang="ko-KR" b="1" dirty="0">
+              <a:solidFill>
+                <a:schemeClr val="bg1"/>
+              </a:solidFill>
+            </a:endParaRPr>
+          </a:p>
+          <a:p>
+            <a:pPr marL="342900" indent="-342900">
+              <a:buAutoNum type="arabicPeriod"/>
+            </a:pPr>
+            <a:r>
+              <a:rPr lang="ko-KR" altLang="en-US" b="1" dirty="0">
+                <a:solidFill>
+                  <a:schemeClr val="bg1"/>
+                </a:solidFill>
+              </a:rPr>
+              <a:t>그냥 </a:t>
+            </a:r>
+            <a:r>
+              <a:rPr lang="ko-KR" altLang="en-US" b="1" dirty="0" err="1">
+                <a:solidFill>
+                  <a:schemeClr val="bg1"/>
+                </a:solidFill>
+              </a:rPr>
+              <a:t>물체오브젝트</a:t>
+            </a:r>
+            <a:r>
+              <a:rPr lang="en-US" altLang="ko-KR" b="1" dirty="0">
+                <a:solidFill>
+                  <a:schemeClr val="bg1"/>
+                </a:solidFill>
+              </a:rPr>
+              <a:t>(Collider)</a:t>
+            </a:r>
+            <a:r>
+              <a:rPr lang="ko-KR" altLang="en-US" b="1" dirty="0" err="1">
+                <a:solidFill>
+                  <a:schemeClr val="bg1"/>
+                </a:solidFill>
+              </a:rPr>
+              <a:t>중력값은</a:t>
+            </a:r>
+            <a:r>
+              <a:rPr lang="ko-KR" altLang="en-US" b="1" dirty="0">
+                <a:solidFill>
+                  <a:schemeClr val="bg1"/>
+                </a:solidFill>
+              </a:rPr>
+              <a:t> 굳이</a:t>
+            </a:r>
+            <a:r>
+              <a:rPr lang="en-US" altLang="ko-KR" b="1" dirty="0">
+                <a:solidFill>
+                  <a:schemeClr val="bg1"/>
+                </a:solidFill>
+              </a:rPr>
+              <a:t>?</a:t>
+            </a:r>
+          </a:p>
+          <a:p>
+            <a:pPr marL="342900" indent="-342900">
+              <a:buAutoNum type="arabicPeriod"/>
+            </a:pPr>
+            <a:r>
+              <a:rPr lang="ko-KR" altLang="en-US" b="1" dirty="0">
+                <a:solidFill>
+                  <a:schemeClr val="bg1"/>
+                </a:solidFill>
+              </a:rPr>
+              <a:t>점수를 </a:t>
+            </a:r>
+            <a:r>
+              <a:rPr lang="ko-KR" altLang="en-US" b="1" dirty="0" err="1">
+                <a:solidFill>
+                  <a:schemeClr val="bg1"/>
+                </a:solidFill>
+              </a:rPr>
+              <a:t>다먹어야</a:t>
+            </a:r>
+            <a:r>
+              <a:rPr lang="ko-KR" altLang="en-US" b="1" dirty="0">
+                <a:solidFill>
+                  <a:schemeClr val="bg1"/>
+                </a:solidFill>
+              </a:rPr>
+              <a:t> 다음 </a:t>
+            </a:r>
+            <a:r>
+              <a:rPr lang="en-US" altLang="ko-KR" b="1" dirty="0">
+                <a:solidFill>
+                  <a:schemeClr val="bg1"/>
+                </a:solidFill>
+              </a:rPr>
+              <a:t>Stage</a:t>
+            </a:r>
+            <a:r>
+              <a:rPr lang="ko-KR" altLang="en-US" b="1" dirty="0">
+                <a:solidFill>
+                  <a:schemeClr val="bg1"/>
+                </a:solidFill>
+              </a:rPr>
+              <a:t>가짐</a:t>
+            </a:r>
+            <a:endParaRPr lang="en-US" altLang="ko-KR" b="1" dirty="0">
+              <a:solidFill>
+                <a:schemeClr val="bg1"/>
+              </a:solidFill>
+            </a:endParaRPr>
+          </a:p>
+          <a:p>
+            <a:pPr marL="342900" indent="-342900">
+              <a:buAutoNum type="arabicPeriod"/>
+            </a:pPr>
+            <a:r>
+              <a:rPr lang="ko-KR" altLang="en-US" b="1" dirty="0">
+                <a:solidFill>
+                  <a:schemeClr val="bg1"/>
+                </a:solidFill>
+              </a:rPr>
+              <a:t>플레이어 이동</a:t>
+            </a:r>
+            <a:r>
+              <a:rPr lang="en-US" altLang="ko-KR" b="1" dirty="0">
+                <a:solidFill>
+                  <a:schemeClr val="bg1"/>
+                </a:solidFill>
+              </a:rPr>
+              <a:t>UI</a:t>
+            </a:r>
+            <a:r>
+              <a:rPr lang="ko-KR" altLang="en-US" b="1" dirty="0">
+                <a:solidFill>
+                  <a:schemeClr val="bg1"/>
+                </a:solidFill>
+              </a:rPr>
+              <a:t>를 눌러 좌</a:t>
+            </a:r>
+            <a:r>
+              <a:rPr lang="en-US" altLang="ko-KR" b="1" dirty="0">
+                <a:solidFill>
+                  <a:schemeClr val="bg1"/>
+                </a:solidFill>
+              </a:rPr>
+              <a:t>/</a:t>
+            </a:r>
+            <a:r>
+              <a:rPr lang="ko-KR" altLang="en-US" b="1" dirty="0">
+                <a:solidFill>
+                  <a:schemeClr val="bg1"/>
+                </a:solidFill>
+              </a:rPr>
+              <a:t>우 이동가능</a:t>
+            </a:r>
+            <a:endParaRPr lang="en-US" altLang="ko-KR" b="1" dirty="0">
+              <a:solidFill>
+                <a:schemeClr val="bg1"/>
+              </a:solidFill>
+            </a:endParaRPr>
+          </a:p>
+          <a:p>
+            <a:pPr marL="342900" indent="-342900">
+              <a:buAutoNum type="arabicPeriod"/>
+            </a:pPr>
+            <a:r>
+              <a:rPr lang="ko-KR" altLang="en-US" b="1" dirty="0">
+                <a:solidFill>
+                  <a:schemeClr val="bg1"/>
+                </a:solidFill>
+              </a:rPr>
+              <a:t>뒷배경을 움직이든 뭐든 제일 </a:t>
+            </a:r>
+            <a:r>
+              <a:rPr lang="ko-KR" altLang="en-US" b="1" dirty="0" err="1">
+                <a:solidFill>
+                  <a:schemeClr val="bg1"/>
+                </a:solidFill>
+              </a:rPr>
+              <a:t>뒤에있음</a:t>
+            </a:r>
+            <a:endParaRPr lang="en-US" altLang="ko-KR" b="1" dirty="0">
+              <a:solidFill>
+                <a:schemeClr val="bg1"/>
+              </a:solidFill>
+            </a:endParaRPr>
+          </a:p>
+          <a:p>
+            <a:pPr marL="342900" indent="-342900">
+              <a:buAutoNum type="arabicPeriod"/>
+            </a:pPr>
+            <a:r>
+              <a:rPr lang="ko-KR" altLang="en-US" b="1" dirty="0">
+                <a:solidFill>
+                  <a:schemeClr val="bg1"/>
+                </a:solidFill>
+              </a:rPr>
+              <a:t>플레이어는 계속 </a:t>
+            </a:r>
+            <a:r>
+              <a:rPr lang="ko-KR" altLang="en-US" b="1" dirty="0" err="1">
+                <a:solidFill>
+                  <a:schemeClr val="bg1"/>
+                </a:solidFill>
+              </a:rPr>
+              <a:t>통통튄다</a:t>
+            </a:r>
+            <a:endParaRPr lang="ko-KR" altLang="en-US" b="1" dirty="0">
+              <a:solidFill>
+                <a:schemeClr val="bg1"/>
+              </a:solidFill>
+            </a:endParaRPr>
+          </a:p>
+        </p:txBody>
+      </p:sp>
+      <p:pic>
+        <p:nvPicPr>
+          <p:cNvPr id="24" name="그림 23">
+            <a:extLst>
+              <a:ext uri="{FF2B5EF4-FFF2-40B4-BE49-F238E27FC236}">
+                <a16:creationId xmlns:a16="http://schemas.microsoft.com/office/drawing/2014/main" id="{B19B5EC6-8939-F22D-EFEA-5BEE5D993AC2}"/>
+              </a:ext>
+            </a:extLst>
+          </p:cNvPr>
+          <p:cNvPicPr>
+            <a:picLocks noChangeAspect="1"/>
+          </p:cNvPicPr>
+          <p:nvPr/>
+        </p:nvPicPr>
+        <p:blipFill>
+          <a:blip r:embed="rId8"/>
+          <a:stretch>
+            <a:fillRect/>
+          </a:stretch>
+        </p:blipFill>
+        <p:spPr>
+          <a:xfrm>
+            <a:off x="10070736" y="4790973"/>
+            <a:ext cx="1010551" cy="1050441"/>
+          </a:xfrm>
+          <a:prstGeom prst="rect">
+            <a:avLst/>
+          </a:prstGeom>
+        </p:spPr>
+      </p:pic>
+      <p:sp>
+        <p:nvSpPr>
+          <p:cNvPr id="25" name="TextBox 24">
+            <a:extLst>
+              <a:ext uri="{FF2B5EF4-FFF2-40B4-BE49-F238E27FC236}">
+                <a16:creationId xmlns:a16="http://schemas.microsoft.com/office/drawing/2014/main" id="{91650D56-796C-1B8B-2E64-1994F6728E6D}"/>
+              </a:ext>
+            </a:extLst>
+          </p:cNvPr>
+          <p:cNvSpPr txBox="1"/>
+          <p:nvPr/>
+        </p:nvSpPr>
+        <p:spPr>
+          <a:xfrm>
+            <a:off x="8580575" y="6077978"/>
+            <a:ext cx="3264868" cy="369332"/>
+          </a:xfrm>
+          <a:prstGeom prst="rect">
+            <a:avLst/>
+          </a:prstGeom>
+          <a:noFill/>
+        </p:spPr>
+        <p:txBody>
+          <a:bodyPr wrap="none" rtlCol="0">
+            <a:spAutoFit/>
+          </a:bodyPr>
+          <a:lstStyle/>
+          <a:p>
+            <a:r>
+              <a:rPr lang="ko-KR" altLang="en-US" dirty="0"/>
+              <a:t>점수를 </a:t>
+            </a:r>
+            <a:r>
+              <a:rPr lang="ko-KR" altLang="en-US" dirty="0" err="1"/>
+              <a:t>먹을시</a:t>
+            </a:r>
+            <a:r>
+              <a:rPr lang="ko-KR" altLang="en-US" dirty="0"/>
+              <a:t> 생기는 </a:t>
+            </a:r>
+            <a:r>
+              <a:rPr lang="en-US" altLang="ko-KR" dirty="0"/>
+              <a:t>Particle</a:t>
+            </a:r>
+            <a:endParaRPr lang="ko-KR" altLang="en-US" dirty="0"/>
+          </a:p>
+        </p:txBody>
+      </p:sp>
+      <p:pic>
+        <p:nvPicPr>
+          <p:cNvPr id="27" name="그림 26">
+            <a:extLst>
+              <a:ext uri="{FF2B5EF4-FFF2-40B4-BE49-F238E27FC236}">
+                <a16:creationId xmlns:a16="http://schemas.microsoft.com/office/drawing/2014/main" id="{AF1AD0DF-F257-6D07-FA57-BF86F5E461D8}"/>
+              </a:ext>
+            </a:extLst>
+          </p:cNvPr>
+          <p:cNvPicPr>
+            <a:picLocks noChangeAspect="1"/>
+          </p:cNvPicPr>
+          <p:nvPr/>
+        </p:nvPicPr>
+        <p:blipFill>
+          <a:blip r:embed="rId9"/>
+          <a:stretch>
+            <a:fillRect/>
+          </a:stretch>
+        </p:blipFill>
+        <p:spPr>
+          <a:xfrm>
+            <a:off x="3007015" y="2921803"/>
+            <a:ext cx="1247774" cy="766762"/>
+          </a:xfrm>
+          <a:prstGeom prst="rect">
+            <a:avLst/>
+          </a:prstGeom>
+        </p:spPr>
+      </p:pic>
+      <p:sp>
+        <p:nvSpPr>
+          <p:cNvPr id="28" name="TextBox 27">
+            <a:extLst>
+              <a:ext uri="{FF2B5EF4-FFF2-40B4-BE49-F238E27FC236}">
+                <a16:creationId xmlns:a16="http://schemas.microsoft.com/office/drawing/2014/main" id="{70FB937D-DE59-EFA7-0F2B-60377021E882}"/>
+              </a:ext>
+            </a:extLst>
+          </p:cNvPr>
+          <p:cNvSpPr txBox="1"/>
+          <p:nvPr/>
+        </p:nvSpPr>
+        <p:spPr>
+          <a:xfrm>
+            <a:off x="1806048" y="3878920"/>
+            <a:ext cx="3726533" cy="369332"/>
+          </a:xfrm>
+          <a:prstGeom prst="rect">
+            <a:avLst/>
+          </a:prstGeom>
+          <a:noFill/>
+        </p:spPr>
+        <p:txBody>
+          <a:bodyPr wrap="none" rtlCol="0">
+            <a:spAutoFit/>
+          </a:bodyPr>
+          <a:lstStyle/>
+          <a:p>
+            <a:r>
+              <a:rPr lang="ko-KR" altLang="en-US" dirty="0"/>
+              <a:t>플레이어가 </a:t>
+            </a:r>
+            <a:r>
+              <a:rPr lang="ko-KR" altLang="en-US" dirty="0" err="1"/>
+              <a:t>죽을때</a:t>
+            </a:r>
+            <a:r>
+              <a:rPr lang="ko-KR" altLang="en-US" dirty="0"/>
+              <a:t> 생기는 </a:t>
+            </a:r>
+            <a:r>
+              <a:rPr lang="en-US" altLang="ko-KR" dirty="0"/>
+              <a:t>Particle</a:t>
+            </a:r>
+            <a:endParaRPr lang="ko-KR" altLang="en-US" dirty="0"/>
+          </a:p>
+        </p:txBody>
+      </p:sp>
+    </p:spTree>
+    <p:extLst>
+      <p:ext uri="{BB962C8B-B14F-4D97-AF65-F5344CB8AC3E}">
+        <p14:creationId xmlns:p14="http://schemas.microsoft.com/office/powerpoint/2010/main" val="3883708373"/>
+      </p:ext>
+    </p:extLst>
+  </p:cSld>
+  <p:clrMapOvr>
+    <a:masterClrMapping/>
+  </p:clrMapOvr>
+</p:sld>
+</file>
+
+<file path=ppt/slides/slide7.xml><?xml version="1.0" encoding="utf-8"?>
+<p:sld xmlns:a="http://schemas.openxmlformats.org/drawingml/2006/main" xmlns:r="http://schemas.openxmlformats.org/officeDocument/2006/relationships" xmlns:p="http://schemas.openxmlformats.org/presentationml/2006/main">
+  <p:cSld>
+    <p:bg>
+      <p:bgPr>
+        <a:solidFill>
+          <a:schemeClr val="accent5"/>
+        </a:solidFill>
+        <a:effectLst/>
+      </p:bgPr>
+    </p:bg>
+    <p:spTree>
+      <p:nvGrpSpPr>
+        <p:cNvPr id="1" name=""/>
+        <p:cNvGrpSpPr/>
+        <p:nvPr/>
+      </p:nvGrpSpPr>
+      <p:grpSpPr>
+        <a:xfrm>
+          <a:off x="0" y="0"/>
+          <a:ext cx="0" cy="0"/>
+          <a:chOff x="0" y="0"/>
+          <a:chExt cx="0" cy="0"/>
+        </a:xfrm>
+      </p:grpSpPr>
+      <p:pic>
+        <p:nvPicPr>
+          <p:cNvPr id="3" name="그림 2">
+            <a:extLst>
+              <a:ext uri="{FF2B5EF4-FFF2-40B4-BE49-F238E27FC236}">
+                <a16:creationId xmlns:a16="http://schemas.microsoft.com/office/drawing/2014/main" id="{ED055EC0-A4BF-0103-8BB7-089108192CA1}"/>
+              </a:ext>
+            </a:extLst>
+          </p:cNvPr>
+          <p:cNvPicPr>
+            <a:picLocks noChangeAspect="1"/>
+          </p:cNvPicPr>
+          <p:nvPr/>
+        </p:nvPicPr>
+        <p:blipFill>
+          <a:blip r:embed="rId2"/>
+          <a:stretch>
+            <a:fillRect/>
+          </a:stretch>
+        </p:blipFill>
+        <p:spPr>
+          <a:xfrm>
+            <a:off x="3723341" y="849507"/>
+            <a:ext cx="4745318" cy="2310047"/>
+          </a:xfrm>
+          <a:prstGeom prst="rect">
+            <a:avLst/>
+          </a:prstGeom>
+        </p:spPr>
+      </p:pic>
+      <p:sp>
+        <p:nvSpPr>
+          <p:cNvPr id="4" name="TextBox 3">
+            <a:extLst>
+              <a:ext uri="{FF2B5EF4-FFF2-40B4-BE49-F238E27FC236}">
+                <a16:creationId xmlns:a16="http://schemas.microsoft.com/office/drawing/2014/main" id="{D07BE8B4-FA3F-39A2-A86C-98FE4DC9F29B}"/>
+              </a:ext>
+            </a:extLst>
+          </p:cNvPr>
+          <p:cNvSpPr txBox="1"/>
+          <p:nvPr/>
+        </p:nvSpPr>
+        <p:spPr>
+          <a:xfrm>
+            <a:off x="1670812" y="3781573"/>
+            <a:ext cx="9314473" cy="1754326"/>
+          </a:xfrm>
+          <a:prstGeom prst="rect">
+            <a:avLst/>
+          </a:prstGeom>
+          <a:noFill/>
+        </p:spPr>
+        <p:txBody>
+          <a:bodyPr wrap="none" rtlCol="0">
+            <a:spAutoFit/>
+          </a:bodyPr>
+          <a:lstStyle/>
+          <a:p>
+            <a:r>
+              <a:rPr lang="ko-KR" altLang="en-US" b="1" dirty="0" err="1">
+                <a:solidFill>
+                  <a:schemeClr val="bg1"/>
+                </a:solidFill>
+              </a:rPr>
+              <a:t>들어가는기능</a:t>
+            </a:r>
+            <a:endParaRPr lang="en-US" altLang="ko-KR" b="1" dirty="0">
+              <a:solidFill>
+                <a:schemeClr val="bg1"/>
+              </a:solidFill>
+            </a:endParaRPr>
+          </a:p>
+          <a:p>
+            <a:endParaRPr lang="en-US" altLang="ko-KR" b="1" dirty="0">
+              <a:solidFill>
+                <a:schemeClr val="bg1"/>
+              </a:solidFill>
+            </a:endParaRPr>
+          </a:p>
+          <a:p>
+            <a:pPr marL="342900" indent="-342900">
+              <a:buAutoNum type="arabicPeriod"/>
+            </a:pPr>
+            <a:r>
+              <a:rPr lang="ko-KR" altLang="en-US" b="1" dirty="0" err="1">
+                <a:solidFill>
+                  <a:schemeClr val="bg1"/>
+                </a:solidFill>
+              </a:rPr>
+              <a:t>뒤로가기</a:t>
+            </a:r>
+            <a:r>
+              <a:rPr lang="ko-KR" altLang="en-US" b="1" dirty="0">
+                <a:solidFill>
+                  <a:schemeClr val="bg1"/>
+                </a:solidFill>
+              </a:rPr>
+              <a:t> </a:t>
+            </a:r>
+            <a:r>
+              <a:rPr lang="ko-KR" altLang="en-US" b="1" dirty="0" err="1">
+                <a:solidFill>
+                  <a:schemeClr val="bg1"/>
+                </a:solidFill>
+              </a:rPr>
+              <a:t>눌렀을시에</a:t>
+            </a:r>
+            <a:r>
+              <a:rPr lang="ko-KR" altLang="en-US" b="1" dirty="0">
+                <a:solidFill>
+                  <a:schemeClr val="bg1"/>
+                </a:solidFill>
+              </a:rPr>
+              <a:t> 스테이지화면 이동</a:t>
+            </a:r>
+            <a:endParaRPr lang="en-US" altLang="ko-KR" b="1" dirty="0">
+              <a:solidFill>
+                <a:schemeClr val="bg1"/>
+              </a:solidFill>
+            </a:endParaRPr>
+          </a:p>
+          <a:p>
+            <a:pPr marL="342900" indent="-342900">
+              <a:buAutoNum type="arabicPeriod"/>
+            </a:pPr>
+            <a:r>
+              <a:rPr lang="en-US" altLang="ko-KR" b="1" dirty="0">
+                <a:solidFill>
+                  <a:schemeClr val="bg1"/>
+                </a:solidFill>
+              </a:rPr>
+              <a:t>Next Level</a:t>
+            </a:r>
+            <a:r>
+              <a:rPr lang="ko-KR" altLang="en-US" b="1" dirty="0" err="1">
+                <a:solidFill>
+                  <a:schemeClr val="bg1"/>
+                </a:solidFill>
+              </a:rPr>
+              <a:t>눌렀을시</a:t>
+            </a:r>
+            <a:r>
+              <a:rPr lang="ko-KR" altLang="en-US" b="1" dirty="0">
+                <a:solidFill>
+                  <a:schemeClr val="bg1"/>
+                </a:solidFill>
+              </a:rPr>
+              <a:t> 현재 진행한 </a:t>
+            </a:r>
+            <a:r>
+              <a:rPr lang="ko-KR" altLang="en-US" b="1" dirty="0" err="1">
+                <a:solidFill>
+                  <a:schemeClr val="bg1"/>
+                </a:solidFill>
+              </a:rPr>
+              <a:t>난이도에따른</a:t>
+            </a:r>
+            <a:r>
+              <a:rPr lang="ko-KR" altLang="en-US" b="1" dirty="0">
+                <a:solidFill>
+                  <a:schemeClr val="bg1"/>
+                </a:solidFill>
+              </a:rPr>
+              <a:t> </a:t>
+            </a:r>
+            <a:r>
+              <a:rPr lang="ko-KR" altLang="en-US" b="1" dirty="0" err="1">
+                <a:solidFill>
+                  <a:schemeClr val="bg1"/>
+                </a:solidFill>
+              </a:rPr>
+              <a:t>다음맵</a:t>
+            </a:r>
+            <a:r>
+              <a:rPr lang="en-US" altLang="ko-KR" b="1" dirty="0">
+                <a:solidFill>
+                  <a:schemeClr val="bg1"/>
+                </a:solidFill>
+              </a:rPr>
+              <a:t>(Easy</a:t>
+            </a:r>
+            <a:r>
+              <a:rPr lang="ko-KR" altLang="en-US" b="1" dirty="0">
+                <a:solidFill>
+                  <a:schemeClr val="bg1"/>
+                </a:solidFill>
+              </a:rPr>
+              <a:t>면 다음스테이지 </a:t>
+            </a:r>
+            <a:r>
+              <a:rPr lang="en-US" altLang="ko-KR" b="1" dirty="0">
+                <a:solidFill>
+                  <a:schemeClr val="bg1"/>
+                </a:solidFill>
+              </a:rPr>
+              <a:t>Easy</a:t>
+            </a:r>
+            <a:r>
+              <a:rPr lang="ko-KR" altLang="en-US" b="1" dirty="0">
+                <a:solidFill>
+                  <a:schemeClr val="bg1"/>
+                </a:solidFill>
+              </a:rPr>
+              <a:t>로</a:t>
+            </a:r>
+            <a:r>
+              <a:rPr lang="en-US" altLang="ko-KR" b="1" dirty="0">
+                <a:solidFill>
+                  <a:schemeClr val="bg1"/>
+                </a:solidFill>
+              </a:rPr>
+              <a:t>)</a:t>
+            </a:r>
+          </a:p>
+          <a:p>
+            <a:pPr marL="342900" indent="-342900">
+              <a:buAutoNum type="arabicPeriod"/>
+            </a:pPr>
+            <a:r>
+              <a:rPr lang="ko-KR" altLang="en-US" b="1" dirty="0" err="1">
+                <a:solidFill>
+                  <a:schemeClr val="bg1"/>
+                </a:solidFill>
+              </a:rPr>
+              <a:t>난이도에따른</a:t>
+            </a:r>
+            <a:r>
+              <a:rPr lang="ko-KR" altLang="en-US" b="1" dirty="0">
+                <a:solidFill>
+                  <a:schemeClr val="bg1"/>
+                </a:solidFill>
+              </a:rPr>
+              <a:t> </a:t>
+            </a:r>
+            <a:r>
+              <a:rPr lang="ko-KR" altLang="en-US" b="1" dirty="0" err="1">
+                <a:solidFill>
+                  <a:schemeClr val="bg1"/>
+                </a:solidFill>
+              </a:rPr>
+              <a:t>별개수</a:t>
+            </a:r>
+            <a:r>
+              <a:rPr lang="en-US" altLang="ko-KR" b="1" dirty="0">
+                <a:solidFill>
+                  <a:schemeClr val="bg1"/>
+                </a:solidFill>
+              </a:rPr>
+              <a:t>(Easy = 1</a:t>
+            </a:r>
+            <a:r>
+              <a:rPr lang="ko-KR" altLang="en-US" b="1" dirty="0">
+                <a:solidFill>
+                  <a:schemeClr val="bg1"/>
+                </a:solidFill>
+              </a:rPr>
+              <a:t>개</a:t>
+            </a:r>
+            <a:r>
+              <a:rPr lang="en-US" altLang="ko-KR" b="1" dirty="0">
+                <a:solidFill>
+                  <a:schemeClr val="bg1"/>
+                </a:solidFill>
+              </a:rPr>
+              <a:t>, Hard = 2</a:t>
+            </a:r>
+            <a:r>
+              <a:rPr lang="ko-KR" altLang="en-US" b="1" dirty="0">
+                <a:solidFill>
+                  <a:schemeClr val="bg1"/>
+                </a:solidFill>
+              </a:rPr>
+              <a:t>개</a:t>
+            </a:r>
+            <a:r>
+              <a:rPr lang="en-US" altLang="ko-KR" b="1" dirty="0">
+                <a:solidFill>
+                  <a:schemeClr val="bg1"/>
+                </a:solidFill>
+              </a:rPr>
+              <a:t>, </a:t>
+            </a:r>
+            <a:r>
+              <a:rPr lang="ko-KR" altLang="en-US" b="1" dirty="0" err="1">
+                <a:solidFill>
+                  <a:schemeClr val="bg1"/>
+                </a:solidFill>
+              </a:rPr>
+              <a:t>둘다깰시</a:t>
+            </a:r>
+            <a:r>
+              <a:rPr lang="ko-KR" altLang="en-US" b="1" dirty="0">
+                <a:solidFill>
+                  <a:schemeClr val="bg1"/>
+                </a:solidFill>
+              </a:rPr>
+              <a:t> </a:t>
+            </a:r>
+            <a:r>
+              <a:rPr lang="en-US" altLang="ko-KR" b="1" dirty="0">
+                <a:solidFill>
+                  <a:schemeClr val="bg1"/>
+                </a:solidFill>
+              </a:rPr>
+              <a:t>Perfect = 3</a:t>
+            </a:r>
+            <a:r>
+              <a:rPr lang="ko-KR" altLang="en-US" b="1" dirty="0">
+                <a:solidFill>
+                  <a:schemeClr val="bg1"/>
+                </a:solidFill>
+              </a:rPr>
+              <a:t>개</a:t>
+            </a:r>
+            <a:r>
+              <a:rPr lang="en-US" altLang="ko-KR" b="1" dirty="0">
+                <a:solidFill>
+                  <a:schemeClr val="bg1"/>
+                </a:solidFill>
+              </a:rPr>
+              <a:t>)</a:t>
+            </a:r>
+          </a:p>
+          <a:p>
+            <a:pPr marL="342900" indent="-342900">
+              <a:buFontTx/>
+              <a:buAutoNum type="arabicPeriod"/>
+            </a:pPr>
+            <a:r>
+              <a:rPr lang="ko-KR" altLang="en-US" b="1" dirty="0">
+                <a:solidFill>
+                  <a:schemeClr val="bg1"/>
+                </a:solidFill>
+              </a:rPr>
+              <a:t>저장기능 </a:t>
+            </a:r>
+            <a:r>
+              <a:rPr lang="ko-KR" altLang="en-US" b="1" dirty="0" err="1">
+                <a:solidFill>
+                  <a:schemeClr val="bg1"/>
+                </a:solidFill>
+              </a:rPr>
+              <a:t>휴대폰을꺼도</a:t>
+            </a:r>
+            <a:r>
+              <a:rPr lang="ko-KR" altLang="en-US" b="1" dirty="0">
+                <a:solidFill>
+                  <a:schemeClr val="bg1"/>
+                </a:solidFill>
+              </a:rPr>
+              <a:t> </a:t>
+            </a:r>
+            <a:r>
+              <a:rPr lang="ko-KR" altLang="en-US" b="1" dirty="0" err="1">
+                <a:solidFill>
+                  <a:schemeClr val="bg1"/>
+                </a:solidFill>
+              </a:rPr>
+              <a:t>진행된정보가</a:t>
+            </a:r>
+            <a:r>
+              <a:rPr lang="ko-KR" altLang="en-US" b="1" dirty="0">
+                <a:solidFill>
+                  <a:schemeClr val="bg1"/>
+                </a:solidFill>
+              </a:rPr>
+              <a:t> 저장</a:t>
+            </a:r>
+            <a:endParaRPr lang="en-US" altLang="ko-KR" b="1" dirty="0">
+              <a:solidFill>
+                <a:schemeClr val="bg1"/>
+              </a:solidFill>
+            </a:endParaRPr>
+          </a:p>
+        </p:txBody>
+      </p:sp>
+    </p:spTree>
+    <p:extLst>
+      <p:ext uri="{BB962C8B-B14F-4D97-AF65-F5344CB8AC3E}">
+        <p14:creationId xmlns:p14="http://schemas.microsoft.com/office/powerpoint/2010/main" val="532404346"/>
       </p:ext>
     </p:extLst>
   </p:cSld>

</xml_diff>